<commit_message>
added images and JS randomiser
</commit_message>
<xml_diff>
--- a/presentation_slides/HTML.pptx
+++ b/presentation_slides/HTML.pptx
@@ -5,21 +5,23 @@
     <p:sldMasterId id="2147483648" r:id="rId4"/>
   </p:sldMasterIdLst>
   <p:notesMasterIdLst>
-    <p:notesMasterId r:id="rId17"/>
+    <p:notesMasterId r:id="rId19"/>
   </p:notesMasterIdLst>
   <p:sldIdLst>
     <p:sldId id="288" r:id="rId5"/>
     <p:sldId id="277" r:id="rId6"/>
-    <p:sldId id="287" r:id="rId7"/>
-    <p:sldId id="278" r:id="rId8"/>
-    <p:sldId id="292" r:id="rId9"/>
-    <p:sldId id="274" r:id="rId10"/>
-    <p:sldId id="293" r:id="rId11"/>
-    <p:sldId id="294" r:id="rId12"/>
-    <p:sldId id="297" r:id="rId13"/>
-    <p:sldId id="298" r:id="rId14"/>
-    <p:sldId id="299" r:id="rId15"/>
-    <p:sldId id="300" r:id="rId16"/>
+    <p:sldId id="301" r:id="rId7"/>
+    <p:sldId id="287" r:id="rId8"/>
+    <p:sldId id="278" r:id="rId9"/>
+    <p:sldId id="292" r:id="rId10"/>
+    <p:sldId id="274" r:id="rId11"/>
+    <p:sldId id="293" r:id="rId12"/>
+    <p:sldId id="294" r:id="rId13"/>
+    <p:sldId id="297" r:id="rId14"/>
+    <p:sldId id="302" r:id="rId15"/>
+    <p:sldId id="298" r:id="rId16"/>
+    <p:sldId id="299" r:id="rId17"/>
+    <p:sldId id="300" r:id="rId18"/>
   </p:sldIdLst>
   <p:sldSz cx="12192000" cy="6858000"/>
   <p:notesSz cx="6858000" cy="2019300"/>
@@ -294,7 +296,7 @@
           <a:p>
             <a:fld id="{9FB5EA18-F66C-4D75-8C80-0C1A1E868DE6}" type="datetimeFigureOut">
               <a:rPr lang="en-US" smtClean="0"/>
-              <a:t>6/12/2020</a:t>
+              <a:t>6/13/2020</a:t>
             </a:fld>
             <a:endParaRPr lang="en-US"/>
           </a:p>
@@ -605,6 +607,10 @@
           <a:bodyPr/>
           <a:lstStyle/>
           <a:p>
+            <a:r>
+              <a:rPr lang="en-US" dirty="0"/>
+              <a:t>The UTF-8 character set has essentially every character we’ll ever use</a:t>
+            </a:r>
             <a:endParaRPr lang="en-NZ" dirty="0"/>
           </a:p>
         </p:txBody>
@@ -626,7 +632,7 @@
           <a:p>
             <a:fld id="{A008DDF4-253B-4E36-BE28-46B8E6426B7B}" type="slidenum">
               <a:rPr lang="en-US" smtClean="0"/>
-              <a:t>3</a:t>
+              <a:t>1</a:t>
             </a:fld>
             <a:endParaRPr lang="en-US"/>
           </a:p>
@@ -635,7 +641,7 @@
     </p:spTree>
     <p:extLst>
       <p:ext uri="{BB962C8B-B14F-4D97-AF65-F5344CB8AC3E}">
-        <p14:creationId xmlns:p14="http://schemas.microsoft.com/office/powerpoint/2010/main" val="441437025"/>
+        <p14:creationId xmlns:p14="http://schemas.microsoft.com/office/powerpoint/2010/main" val="61044521"/>
       </p:ext>
     </p:extLst>
   </p:cSld>
@@ -689,7 +695,10 @@
           <a:bodyPr/>
           <a:lstStyle/>
           <a:p>
-            <a:endParaRPr lang="en-US" dirty="0"/>
+            <a:r>
+              <a:rPr lang="en-US" dirty="0"/>
+              <a:t>Multiple Different attributes can be placed into the header tag of an element</a:t>
+            </a:r>
           </a:p>
         </p:txBody>
       </p:sp>
@@ -711,6 +720,174 @@
             <a:fld id="{A008DDF4-253B-4E36-BE28-46B8E6426B7B}" type="slidenum">
               <a:rPr lang="en-US" smtClean="0"/>
               <a:t>12</a:t>
+            </a:fld>
+            <a:endParaRPr lang="en-US"/>
+          </a:p>
+        </p:txBody>
+      </p:sp>
+    </p:spTree>
+    <p:extLst>
+      <p:ext uri="{BB962C8B-B14F-4D97-AF65-F5344CB8AC3E}">
+        <p14:creationId xmlns:p14="http://schemas.microsoft.com/office/powerpoint/2010/main" val="2797131968"/>
+      </p:ext>
+    </p:extLst>
+  </p:cSld>
+  <p:clrMapOvr>
+    <a:masterClrMapping/>
+  </p:clrMapOvr>
+</p:notes>
+</file>
+
+<file path=ppt/notesSlides/notesSlide11.xml><?xml version="1.0" encoding="utf-8"?>
+<p:notes xmlns:a="http://schemas.openxmlformats.org/drawingml/2006/main" xmlns:r="http://schemas.openxmlformats.org/officeDocument/2006/relationships" xmlns:p="http://schemas.openxmlformats.org/presentationml/2006/main">
+  <p:cSld>
+    <p:spTree>
+      <p:nvGrpSpPr>
+        <p:cNvPr id="1" name=""/>
+        <p:cNvGrpSpPr/>
+        <p:nvPr/>
+      </p:nvGrpSpPr>
+      <p:grpSpPr>
+        <a:xfrm>
+          <a:off x="0" y="0"/>
+          <a:ext cx="0" cy="0"/>
+          <a:chOff x="0" y="0"/>
+          <a:chExt cx="0" cy="0"/>
+        </a:xfrm>
+      </p:grpSpPr>
+      <p:sp>
+        <p:nvSpPr>
+          <p:cNvPr id="2" name="Slide Image Placeholder 1"/>
+          <p:cNvSpPr>
+            <a:spLocks noGrp="1" noRot="1" noChangeAspect="1"/>
+          </p:cNvSpPr>
+          <p:nvPr>
+            <p:ph type="sldImg"/>
+          </p:nvPr>
+        </p:nvSpPr>
+        <p:spPr/>
+      </p:sp>
+      <p:sp>
+        <p:nvSpPr>
+          <p:cNvPr id="3" name="Notes Placeholder 2"/>
+          <p:cNvSpPr>
+            <a:spLocks noGrp="1"/>
+          </p:cNvSpPr>
+          <p:nvPr>
+            <p:ph type="body" idx="1"/>
+          </p:nvPr>
+        </p:nvSpPr>
+        <p:spPr/>
+        <p:txBody>
+          <a:bodyPr/>
+          <a:lstStyle/>
+          <a:p>
+            <a:endParaRPr lang="en-US" dirty="0"/>
+          </a:p>
+        </p:txBody>
+      </p:sp>
+      <p:sp>
+        <p:nvSpPr>
+          <p:cNvPr id="4" name="Slide Number Placeholder 3"/>
+          <p:cNvSpPr>
+            <a:spLocks noGrp="1"/>
+          </p:cNvSpPr>
+          <p:nvPr>
+            <p:ph type="sldNum" sz="quarter" idx="5"/>
+          </p:nvPr>
+        </p:nvSpPr>
+        <p:spPr/>
+        <p:txBody>
+          <a:bodyPr/>
+          <a:lstStyle/>
+          <a:p>
+            <a:fld id="{A008DDF4-253B-4E36-BE28-46B8E6426B7B}" type="slidenum">
+              <a:rPr lang="en-US" smtClean="0"/>
+              <a:t>13</a:t>
+            </a:fld>
+            <a:endParaRPr lang="en-US"/>
+          </a:p>
+        </p:txBody>
+      </p:sp>
+    </p:spTree>
+    <p:extLst>
+      <p:ext uri="{BB962C8B-B14F-4D97-AF65-F5344CB8AC3E}">
+        <p14:creationId xmlns:p14="http://schemas.microsoft.com/office/powerpoint/2010/main" val="761445774"/>
+      </p:ext>
+    </p:extLst>
+  </p:cSld>
+  <p:clrMapOvr>
+    <a:masterClrMapping/>
+  </p:clrMapOvr>
+</p:notes>
+</file>
+
+<file path=ppt/notesSlides/notesSlide12.xml><?xml version="1.0" encoding="utf-8"?>
+<p:notes xmlns:a="http://schemas.openxmlformats.org/drawingml/2006/main" xmlns:r="http://schemas.openxmlformats.org/officeDocument/2006/relationships" xmlns:p="http://schemas.openxmlformats.org/presentationml/2006/main">
+  <p:cSld>
+    <p:spTree>
+      <p:nvGrpSpPr>
+        <p:cNvPr id="1" name=""/>
+        <p:cNvGrpSpPr/>
+        <p:nvPr/>
+      </p:nvGrpSpPr>
+      <p:grpSpPr>
+        <a:xfrm>
+          <a:off x="0" y="0"/>
+          <a:ext cx="0" cy="0"/>
+          <a:chOff x="0" y="0"/>
+          <a:chExt cx="0" cy="0"/>
+        </a:xfrm>
+      </p:grpSpPr>
+      <p:sp>
+        <p:nvSpPr>
+          <p:cNvPr id="2" name="Slide Image Placeholder 1"/>
+          <p:cNvSpPr>
+            <a:spLocks noGrp="1" noRot="1" noChangeAspect="1"/>
+          </p:cNvSpPr>
+          <p:nvPr>
+            <p:ph type="sldImg"/>
+          </p:nvPr>
+        </p:nvSpPr>
+        <p:spPr/>
+      </p:sp>
+      <p:sp>
+        <p:nvSpPr>
+          <p:cNvPr id="3" name="Notes Placeholder 2"/>
+          <p:cNvSpPr>
+            <a:spLocks noGrp="1"/>
+          </p:cNvSpPr>
+          <p:nvPr>
+            <p:ph type="body" idx="1"/>
+          </p:nvPr>
+        </p:nvSpPr>
+        <p:spPr/>
+        <p:txBody>
+          <a:bodyPr/>
+          <a:lstStyle/>
+          <a:p>
+            <a:endParaRPr lang="en-US" dirty="0"/>
+          </a:p>
+        </p:txBody>
+      </p:sp>
+      <p:sp>
+        <p:nvSpPr>
+          <p:cNvPr id="4" name="Slide Number Placeholder 3"/>
+          <p:cNvSpPr>
+            <a:spLocks noGrp="1"/>
+          </p:cNvSpPr>
+          <p:nvPr>
+            <p:ph type="sldNum" sz="quarter" idx="5"/>
+          </p:nvPr>
+        </p:nvSpPr>
+        <p:spPr/>
+        <p:txBody>
+          <a:bodyPr/>
+          <a:lstStyle/>
+          <a:p>
+            <a:fld id="{A008DDF4-253B-4E36-BE28-46B8E6426B7B}" type="slidenum">
+              <a:rPr lang="en-US" smtClean="0"/>
+              <a:t>14</a:t>
             </a:fld>
             <a:endParaRPr lang="en-US"/>
           </a:p>
@@ -773,7 +950,18 @@
           <a:bodyPr/>
           <a:lstStyle/>
           <a:p>
-            <a:endParaRPr lang="en-NZ" dirty="0"/>
+            <a:r>
+              <a:rPr lang="en-NZ" dirty="0"/>
+              <a:t>SO </a:t>
+            </a:r>
+            <a:r>
+              <a:rPr lang="en-NZ" dirty="0" err="1"/>
+              <a:t>il</a:t>
+            </a:r>
+            <a:r>
+              <a:rPr lang="en-NZ" dirty="0"/>
+              <a:t> will be outlining the basic structure of an HTML document and I will be explaining what each tag does and what it means.</a:t>
+            </a:r>
           </a:p>
         </p:txBody>
       </p:sp>
@@ -803,7 +991,7 @@
     </p:spTree>
     <p:extLst>
       <p:ext uri="{BB962C8B-B14F-4D97-AF65-F5344CB8AC3E}">
-        <p14:creationId xmlns:p14="http://schemas.microsoft.com/office/powerpoint/2010/main" val="2833443102"/>
+        <p14:creationId xmlns:p14="http://schemas.microsoft.com/office/powerpoint/2010/main" val="441437025"/>
       </p:ext>
     </p:extLst>
   </p:cSld>
@@ -887,7 +1075,7 @@
     </p:spTree>
     <p:extLst>
       <p:ext uri="{BB962C8B-B14F-4D97-AF65-F5344CB8AC3E}">
-        <p14:creationId xmlns:p14="http://schemas.microsoft.com/office/powerpoint/2010/main" val="2676687323"/>
+        <p14:creationId xmlns:p14="http://schemas.microsoft.com/office/powerpoint/2010/main" val="2833443102"/>
       </p:ext>
     </p:extLst>
   </p:cSld>
@@ -941,7 +1129,10 @@
           <a:bodyPr/>
           <a:lstStyle/>
           <a:p>
-            <a:endParaRPr lang="en-US"/>
+            <a:r>
+              <a:rPr lang="en-NZ" dirty="0"/>
+              <a:t>Meta data is just data about data and it will not be displayed in the web page’s content section.</a:t>
+            </a:r>
           </a:p>
         </p:txBody>
       </p:sp>
@@ -971,7 +1162,7 @@
     </p:spTree>
     <p:extLst>
       <p:ext uri="{BB962C8B-B14F-4D97-AF65-F5344CB8AC3E}">
-        <p14:creationId xmlns:p14="http://schemas.microsoft.com/office/powerpoint/2010/main" val="4076922791"/>
+        <p14:creationId xmlns:p14="http://schemas.microsoft.com/office/powerpoint/2010/main" val="2676687323"/>
       </p:ext>
     </p:extLst>
   </p:cSld>
@@ -1025,7 +1216,31 @@
           <a:bodyPr/>
           <a:lstStyle/>
           <a:p>
-            <a:endParaRPr lang="en-US"/>
+            <a:pPr marL="0" marR="0" lvl="0" indent="0" algn="l" defTabSz="914400" rtl="0" eaLnBrk="1" fontAlgn="auto" latinLnBrk="0" hangingPunct="1">
+              <a:lnSpc>
+                <a:spcPct val="100000"/>
+              </a:lnSpc>
+              <a:spcBef>
+                <a:spcPts val="0"/>
+              </a:spcBef>
+              <a:spcAft>
+                <a:spcPts val="0"/>
+              </a:spcAft>
+              <a:buClrTx/>
+              <a:buSzTx/>
+              <a:buFontTx/>
+              <a:buNone/>
+              <a:tabLst/>
+              <a:defRPr/>
+            </a:pPr>
+            <a:r>
+              <a:rPr lang="en-US" dirty="0"/>
+              <a:t>The UTF-8 character set has essentially every character we’ll ever use</a:t>
+            </a:r>
+            <a:endParaRPr lang="en-NZ" dirty="0"/>
+          </a:p>
+          <a:p>
+            <a:endParaRPr lang="en-US" dirty="0"/>
           </a:p>
         </p:txBody>
       </p:sp>
@@ -1055,7 +1270,7 @@
     </p:spTree>
     <p:extLst>
       <p:ext uri="{BB962C8B-B14F-4D97-AF65-F5344CB8AC3E}">
-        <p14:creationId xmlns:p14="http://schemas.microsoft.com/office/powerpoint/2010/main" val="3148734499"/>
+        <p14:creationId xmlns:p14="http://schemas.microsoft.com/office/powerpoint/2010/main" val="4076922791"/>
       </p:ext>
     </p:extLst>
   </p:cSld>
@@ -1139,7 +1354,7 @@
     </p:spTree>
     <p:extLst>
       <p:ext uri="{BB962C8B-B14F-4D97-AF65-F5344CB8AC3E}">
-        <p14:creationId xmlns:p14="http://schemas.microsoft.com/office/powerpoint/2010/main" val="725611853"/>
+        <p14:creationId xmlns:p14="http://schemas.microsoft.com/office/powerpoint/2010/main" val="3148734499"/>
       </p:ext>
     </p:extLst>
   </p:cSld>
@@ -1193,7 +1408,10 @@
           <a:bodyPr/>
           <a:lstStyle/>
           <a:p>
-            <a:endParaRPr lang="en-US" dirty="0"/>
+            <a:r>
+              <a:rPr lang="en-US" dirty="0"/>
+              <a:t>This is section that we will be coding in most of the time.</a:t>
+            </a:r>
           </a:p>
         </p:txBody>
       </p:sp>
@@ -1223,7 +1441,7 @@
     </p:spTree>
     <p:extLst>
       <p:ext uri="{BB962C8B-B14F-4D97-AF65-F5344CB8AC3E}">
-        <p14:creationId xmlns:p14="http://schemas.microsoft.com/office/powerpoint/2010/main" val="4154135235"/>
+        <p14:creationId xmlns:p14="http://schemas.microsoft.com/office/powerpoint/2010/main" val="725611853"/>
       </p:ext>
     </p:extLst>
   </p:cSld>
@@ -1277,7 +1495,26 @@
           <a:bodyPr/>
           <a:lstStyle/>
           <a:p>
-            <a:endParaRPr lang="en-US" dirty="0"/>
+            <a:r>
+              <a:rPr lang="en-US" dirty="0"/>
+              <a:t>So </a:t>
+            </a:r>
+            <a:r>
+              <a:rPr lang="en-US" dirty="0" err="1"/>
+              <a:t>weve</a:t>
+            </a:r>
+            <a:r>
+              <a:rPr lang="en-US" dirty="0"/>
+              <a:t> talked about tags a lot, now </a:t>
+            </a:r>
+            <a:r>
+              <a:rPr lang="en-US" dirty="0" err="1"/>
+              <a:t>im</a:t>
+            </a:r>
+            <a:r>
+              <a:rPr lang="en-US" dirty="0"/>
+              <a:t> going to explain the structure of various html elements.</a:t>
+            </a:r>
           </a:p>
         </p:txBody>
       </p:sp>
@@ -1307,7 +1544,7 @@
     </p:spTree>
     <p:extLst>
       <p:ext uri="{BB962C8B-B14F-4D97-AF65-F5344CB8AC3E}">
-        <p14:creationId xmlns:p14="http://schemas.microsoft.com/office/powerpoint/2010/main" val="2797131968"/>
+        <p14:creationId xmlns:p14="http://schemas.microsoft.com/office/powerpoint/2010/main" val="4154135235"/>
       </p:ext>
     </p:extLst>
   </p:cSld>
@@ -1391,7 +1628,7 @@
     </p:spTree>
     <p:extLst>
       <p:ext uri="{BB962C8B-B14F-4D97-AF65-F5344CB8AC3E}">
-        <p14:creationId xmlns:p14="http://schemas.microsoft.com/office/powerpoint/2010/main" val="761445774"/>
+        <p14:creationId xmlns:p14="http://schemas.microsoft.com/office/powerpoint/2010/main" val="3661900287"/>
       </p:ext>
     </p:extLst>
   </p:cSld>
@@ -1536,7 +1773,7 @@
           <a:p>
             <a:fld id="{4BFC623A-4806-45FB-9E07-894B153158FF}" type="datetimeFigureOut">
               <a:rPr lang="en-US" smtClean="0"/>
-              <a:t>6/12/2020</a:t>
+              <a:t>6/13/2020</a:t>
             </a:fld>
             <a:endParaRPr lang="en-US"/>
           </a:p>
@@ -1742,7 +1979,7 @@
           <a:p>
             <a:fld id="{4BFC623A-4806-45FB-9E07-894B153158FF}" type="datetimeFigureOut">
               <a:rPr lang="en-US" smtClean="0"/>
-              <a:t>6/12/2020</a:t>
+              <a:t>6/13/2020</a:t>
             </a:fld>
             <a:endParaRPr lang="en-US"/>
           </a:p>
@@ -1992,7 +2229,7 @@
           <a:p>
             <a:fld id="{4BFC623A-4806-45FB-9E07-894B153158FF}" type="datetimeFigureOut">
               <a:rPr lang="en-US" smtClean="0"/>
-              <a:t>6/12/2020</a:t>
+              <a:t>6/13/2020</a:t>
             </a:fld>
             <a:endParaRPr lang="en-US"/>
           </a:p>
@@ -2228,7 +2465,7 @@
           <a:p>
             <a:fld id="{4BFC623A-4806-45FB-9E07-894B153158FF}" type="datetimeFigureOut">
               <a:rPr lang="en-US" smtClean="0"/>
-              <a:t>6/12/2020</a:t>
+              <a:t>6/13/2020</a:t>
             </a:fld>
             <a:endParaRPr lang="en-US"/>
           </a:p>
@@ -2345,7 +2582,7 @@
           <a:p>
             <a:fld id="{4BFC623A-4806-45FB-9E07-894B153158FF}" type="datetimeFigureOut">
               <a:rPr lang="en-US" smtClean="0"/>
-              <a:t>6/12/2020</a:t>
+              <a:t>6/13/2020</a:t>
             </a:fld>
             <a:endParaRPr lang="en-US"/>
           </a:p>
@@ -2450,7 +2687,7 @@
           <a:p>
             <a:fld id="{4BFC623A-4806-45FB-9E07-894B153158FF}" type="datetimeFigureOut">
               <a:rPr lang="en-US" smtClean="0"/>
-              <a:t>6/12/2020</a:t>
+              <a:t>6/13/2020</a:t>
             </a:fld>
             <a:endParaRPr lang="en-US"/>
           </a:p>
@@ -2735,7 +2972,7 @@
           <a:p>
             <a:fld id="{4BFC623A-4806-45FB-9E07-894B153158FF}" type="datetimeFigureOut">
               <a:rPr lang="en-US" smtClean="0"/>
-              <a:t>6/12/2020</a:t>
+              <a:t>6/13/2020</a:t>
             </a:fld>
             <a:endParaRPr lang="en-US"/>
           </a:p>
@@ -2959,7 +3196,7 @@
           <a:p>
             <a:fld id="{4BFC623A-4806-45FB-9E07-894B153158FF}" type="datetimeFigureOut">
               <a:rPr lang="en-US" smtClean="0"/>
-              <a:t>6/12/2020</a:t>
+              <a:t>6/13/2020</a:t>
             </a:fld>
             <a:endParaRPr lang="en-US"/>
           </a:p>
@@ -3499,7 +3736,7 @@
           <p:nvPr/>
         </p:nvPicPr>
         <p:blipFill rotWithShape="1">
-          <a:blip r:embed="rId2">
+          <a:blip r:embed="rId3">
             <a:extLst>
               <a:ext uri="{28A0092B-C50C-407E-A947-70E740481C1C}">
                 <a14:useLocalDpi xmlns:a14="http://schemas.microsoft.com/office/drawing/2010/main" val="0"/>
@@ -3534,13 +3771,13 @@
           <p:nvPr/>
         </p:nvPicPr>
         <p:blipFill>
-          <a:blip r:embed="rId3">
+          <a:blip r:embed="rId4">
             <a:extLst>
               <a:ext uri="{28A0092B-C50C-407E-A947-70E740481C1C}">
                 <a14:useLocalDpi xmlns:a14="http://schemas.microsoft.com/office/drawing/2010/main" val="0"/>
               </a:ext>
               <a:ext uri="{96DAC541-7B7A-43D3-8B79-37D633B846F1}">
-                <asvg:svgBlip xmlns:asvg="http://schemas.microsoft.com/office/drawing/2016/SVG/main" r:embed="rId4"/>
+                <asvg:svgBlip xmlns:asvg="http://schemas.microsoft.com/office/drawing/2016/SVG/main" r:embed="rId5"/>
               </a:ext>
             </a:extLst>
           </a:blip>
@@ -3603,13 +3840,14 @@
             </a:lvl1pPr>
           </a:lstStyle>
           <a:p>
+            <a:pPr algn="ctr"/>
             <a:r>
               <a:rPr lang="en-US" dirty="0">
                 <a:solidFill>
                   <a:schemeClr val="bg1"/>
                 </a:solidFill>
               </a:rPr>
-              <a:t>Introduction To Web Development</a:t>
+              <a:t>Introduction To Web Development HTML</a:t>
             </a:r>
           </a:p>
         </p:txBody>
@@ -3757,17 +3995,17 @@
                   </a:schemeClr>
                 </a:solidFill>
               </a:rPr>
-              <a:t>The class attribute specifies the class that the element belongs to and is mostly referred upon from a CSS.</a:t>
+              <a:t>An HTML element is comprised of an opening tag, the content and the closing tag.</a:t>
             </a:r>
           </a:p>
         </p:txBody>
       </p:sp>
       <p:pic>
         <p:nvPicPr>
-          <p:cNvPr id="11" name="Picture 10" descr="A picture containing sitting, black&#10;&#10;Description automatically generated">
+          <p:cNvPr id="10" name="Picture 9">
             <a:extLst>
               <a:ext uri="{FF2B5EF4-FFF2-40B4-BE49-F238E27FC236}">
-                <a16:creationId xmlns:a16="http://schemas.microsoft.com/office/drawing/2014/main" id="{E1103AF5-815B-4671-BA46-E864F09F3FA9}"/>
+                <a16:creationId xmlns:a16="http://schemas.microsoft.com/office/drawing/2014/main" id="{C12BE7FA-678A-4AC3-94EF-08C9EEBF2331}"/>
               </a:ext>
             </a:extLst>
           </p:cNvPr>
@@ -3776,32 +4014,259 @@
           </p:cNvPicPr>
           <p:nvPr/>
         </p:nvPicPr>
-        <p:blipFill>
-          <a:blip r:embed="rId4">
-            <a:extLst>
-              <a:ext uri="{28A0092B-C50C-407E-A947-70E740481C1C}">
-                <a14:useLocalDpi xmlns:a14="http://schemas.microsoft.com/office/drawing/2010/main" val="0"/>
-              </a:ext>
-            </a:extLst>
-          </a:blip>
-          <a:stretch>
-            <a:fillRect/>
-          </a:stretch>
+        <p:blipFill rotWithShape="1">
+          <a:blip r:embed="rId4"/>
+          <a:srcRect l="10380" t="66412" r="63556" b="23485"/>
+          <a:stretch/>
         </p:blipFill>
         <p:spPr>
           <a:xfrm>
-            <a:off x="1214428" y="3429000"/>
-            <a:ext cx="9566234" cy="1689558"/>
+            <a:off x="2111399" y="3821986"/>
+            <a:ext cx="7969202" cy="955496"/>
           </a:xfrm>
           <a:prstGeom prst="rect">
             <a:avLst/>
           </a:prstGeom>
         </p:spPr>
       </p:pic>
+      <p:pic>
+        <p:nvPicPr>
+          <p:cNvPr id="5" name="Picture 4" descr="A close up of a mans face&#10;&#10;Description automatically generated">
+            <a:extLst>
+              <a:ext uri="{FF2B5EF4-FFF2-40B4-BE49-F238E27FC236}">
+                <a16:creationId xmlns:a16="http://schemas.microsoft.com/office/drawing/2014/main" id="{0B08982F-6E50-4986-9EEB-1BA8E094C65D}"/>
+              </a:ext>
+            </a:extLst>
+          </p:cNvPr>
+          <p:cNvPicPr>
+            <a:picLocks noChangeAspect="1"/>
+          </p:cNvPicPr>
+          <p:nvPr/>
+        </p:nvPicPr>
+        <p:blipFill rotWithShape="1">
+          <a:blip r:embed="rId5">
+            <a:extLst>
+              <a:ext uri="{28A0092B-C50C-407E-A947-70E740481C1C}">
+                <a14:useLocalDpi xmlns:a14="http://schemas.microsoft.com/office/drawing/2010/main" val="0"/>
+              </a:ext>
+            </a:extLst>
+          </a:blip>
+          <a:srcRect l="37765" r="37266"/>
+          <a:stretch/>
+        </p:blipFill>
+        <p:spPr>
+          <a:xfrm rot="16200000">
+            <a:off x="2782584" y="4514849"/>
+            <a:ext cx="256854" cy="1028700"/>
+          </a:xfrm>
+          <a:prstGeom prst="rect">
+            <a:avLst/>
+          </a:prstGeom>
+        </p:spPr>
+      </p:pic>
+      <p:pic>
+        <p:nvPicPr>
+          <p:cNvPr id="11" name="Picture 10" descr="A close up of a mans face&#10;&#10;Description automatically generated">
+            <a:extLst>
+              <a:ext uri="{FF2B5EF4-FFF2-40B4-BE49-F238E27FC236}">
+                <a16:creationId xmlns:a16="http://schemas.microsoft.com/office/drawing/2014/main" id="{48CCC3BE-6FD2-4852-AF99-DF2627108D25}"/>
+              </a:ext>
+            </a:extLst>
+          </p:cNvPr>
+          <p:cNvPicPr>
+            <a:picLocks noChangeAspect="1"/>
+          </p:cNvPicPr>
+          <p:nvPr/>
+        </p:nvPicPr>
+        <p:blipFill rotWithShape="1">
+          <a:blip r:embed="rId5">
+            <a:extLst>
+              <a:ext uri="{28A0092B-C50C-407E-A947-70E740481C1C}">
+                <a14:useLocalDpi xmlns:a14="http://schemas.microsoft.com/office/drawing/2010/main" val="0"/>
+              </a:ext>
+            </a:extLst>
+          </a:blip>
+          <a:srcRect l="37765" r="37266"/>
+          <a:stretch/>
+        </p:blipFill>
+        <p:spPr>
+          <a:xfrm rot="16200000">
+            <a:off x="8847415" y="4514849"/>
+            <a:ext cx="256854" cy="1028700"/>
+          </a:xfrm>
+          <a:prstGeom prst="rect">
+            <a:avLst/>
+          </a:prstGeom>
+        </p:spPr>
+      </p:pic>
+      <p:pic>
+        <p:nvPicPr>
+          <p:cNvPr id="12" name="Picture 11" descr="A close up of a mans face&#10;&#10;Description automatically generated">
+            <a:extLst>
+              <a:ext uri="{FF2B5EF4-FFF2-40B4-BE49-F238E27FC236}">
+                <a16:creationId xmlns:a16="http://schemas.microsoft.com/office/drawing/2014/main" id="{91B7851B-0D3F-4C69-BA17-2124A1CB4122}"/>
+              </a:ext>
+            </a:extLst>
+          </p:cNvPr>
+          <p:cNvPicPr>
+            <a:picLocks noChangeAspect="1"/>
+          </p:cNvPicPr>
+          <p:nvPr/>
+        </p:nvPicPr>
+        <p:blipFill rotWithShape="1">
+          <a:blip r:embed="rId5">
+            <a:extLst>
+              <a:ext uri="{28A0092B-C50C-407E-A947-70E740481C1C}">
+                <a14:useLocalDpi xmlns:a14="http://schemas.microsoft.com/office/drawing/2010/main" val="0"/>
+              </a:ext>
+            </a:extLst>
+          </a:blip>
+          <a:srcRect l="37765" r="37266" b="7382"/>
+          <a:stretch/>
+        </p:blipFill>
+        <p:spPr>
+          <a:xfrm rot="16200000">
+            <a:off x="5680021" y="2541511"/>
+            <a:ext cx="422214" cy="5140734"/>
+          </a:xfrm>
+          <a:prstGeom prst="rect">
+            <a:avLst/>
+          </a:prstGeom>
+        </p:spPr>
+      </p:pic>
+      <p:sp>
+        <p:nvSpPr>
+          <p:cNvPr id="14" name="TextBox 13">
+            <a:extLst>
+              <a:ext uri="{FF2B5EF4-FFF2-40B4-BE49-F238E27FC236}">
+                <a16:creationId xmlns:a16="http://schemas.microsoft.com/office/drawing/2014/main" id="{11647E9D-C54C-4DE2-ADAC-F8B834A1250A}"/>
+              </a:ext>
+            </a:extLst>
+          </p:cNvPr>
+          <p:cNvSpPr txBox="1"/>
+          <p:nvPr/>
+        </p:nvSpPr>
+        <p:spPr>
+          <a:xfrm>
+            <a:off x="1590759" y="5157626"/>
+            <a:ext cx="2640503" cy="369332"/>
+          </a:xfrm>
+          <a:prstGeom prst="rect">
+            <a:avLst/>
+          </a:prstGeom>
+          <a:noFill/>
+        </p:spPr>
+        <p:txBody>
+          <a:bodyPr wrap="square" rtlCol="0">
+            <a:spAutoFit/>
+          </a:bodyPr>
+          <a:lstStyle/>
+          <a:p>
+            <a:pPr algn="ctr"/>
+            <a:r>
+              <a:rPr lang="en-NZ" dirty="0">
+                <a:solidFill>
+                  <a:schemeClr val="tx1">
+                    <a:lumMod val="65000"/>
+                    <a:lumOff val="35000"/>
+                  </a:schemeClr>
+                </a:solidFill>
+              </a:rPr>
+              <a:t>Opening tag</a:t>
+            </a:r>
+          </a:p>
+        </p:txBody>
+      </p:sp>
+      <p:sp>
+        <p:nvSpPr>
+          <p:cNvPr id="15" name="TextBox 14">
+            <a:extLst>
+              <a:ext uri="{FF2B5EF4-FFF2-40B4-BE49-F238E27FC236}">
+                <a16:creationId xmlns:a16="http://schemas.microsoft.com/office/drawing/2014/main" id="{42ACE641-2099-4474-AA44-6010E169BB6B}"/>
+              </a:ext>
+            </a:extLst>
+          </p:cNvPr>
+          <p:cNvSpPr txBox="1"/>
+          <p:nvPr/>
+        </p:nvSpPr>
+        <p:spPr>
+          <a:xfrm>
+            <a:off x="4775748" y="5322985"/>
+            <a:ext cx="2640503" cy="369332"/>
+          </a:xfrm>
+          <a:prstGeom prst="rect">
+            <a:avLst/>
+          </a:prstGeom>
+          <a:noFill/>
+        </p:spPr>
+        <p:txBody>
+          <a:bodyPr wrap="square" rtlCol="0">
+            <a:spAutoFit/>
+          </a:bodyPr>
+          <a:lstStyle/>
+          <a:p>
+            <a:pPr algn="ctr"/>
+            <a:r>
+              <a:rPr lang="en-NZ" dirty="0">
+                <a:solidFill>
+                  <a:schemeClr val="tx1">
+                    <a:lumMod val="65000"/>
+                    <a:lumOff val="35000"/>
+                  </a:schemeClr>
+                </a:solidFill>
+              </a:rPr>
+              <a:t>Content</a:t>
+            </a:r>
+          </a:p>
+        </p:txBody>
+      </p:sp>
+      <p:sp>
+        <p:nvSpPr>
+          <p:cNvPr id="16" name="TextBox 15">
+            <a:extLst>
+              <a:ext uri="{FF2B5EF4-FFF2-40B4-BE49-F238E27FC236}">
+                <a16:creationId xmlns:a16="http://schemas.microsoft.com/office/drawing/2014/main" id="{A3045E9B-EDF6-4ED0-95B8-9FF582AD5854}"/>
+              </a:ext>
+            </a:extLst>
+          </p:cNvPr>
+          <p:cNvSpPr txBox="1"/>
+          <p:nvPr/>
+        </p:nvSpPr>
+        <p:spPr>
+          <a:xfrm>
+            <a:off x="7685729" y="5169627"/>
+            <a:ext cx="2640503" cy="369332"/>
+          </a:xfrm>
+          <a:prstGeom prst="rect">
+            <a:avLst/>
+          </a:prstGeom>
+          <a:noFill/>
+        </p:spPr>
+        <p:txBody>
+          <a:bodyPr wrap="square" rtlCol="0">
+            <a:spAutoFit/>
+          </a:bodyPr>
+          <a:lstStyle/>
+          <a:p>
+            <a:pPr algn="ctr"/>
+            <a:r>
+              <a:rPr lang="en-NZ" dirty="0">
+                <a:solidFill>
+                  <a:schemeClr val="tx1">
+                    <a:lumMod val="65000"/>
+                    <a:lumOff val="35000"/>
+                  </a:schemeClr>
+                </a:solidFill>
+              </a:rPr>
+              <a:t>Closing tag</a:t>
+            </a:r>
+          </a:p>
+        </p:txBody>
+      </p:sp>
     </p:spTree>
     <p:extLst>
       <p:ext uri="{BB962C8B-B14F-4D97-AF65-F5344CB8AC3E}">
-        <p14:creationId xmlns:p14="http://schemas.microsoft.com/office/powerpoint/2010/main" val="2522116781"/>
+        <p14:creationId xmlns:p14="http://schemas.microsoft.com/office/powerpoint/2010/main" val="1301615436"/>
       </p:ext>
     </p:extLst>
   </p:cSld>
@@ -3903,6 +4368,35 @@
           </a:prstGeom>
         </p:spPr>
       </p:pic>
+      <p:pic>
+        <p:nvPicPr>
+          <p:cNvPr id="21" name="Content Placeholder 4">
+            <a:extLst>
+              <a:ext uri="{FF2B5EF4-FFF2-40B4-BE49-F238E27FC236}">
+                <a16:creationId xmlns:a16="http://schemas.microsoft.com/office/drawing/2014/main" id="{7D6EF10F-02AF-43F3-BEC2-2B335C618774}"/>
+              </a:ext>
+            </a:extLst>
+          </p:cNvPr>
+          <p:cNvPicPr>
+            <a:picLocks noGrp="1" noChangeAspect="1"/>
+          </p:cNvPicPr>
+          <p:nvPr>
+            <p:ph idx="1"/>
+          </p:nvPr>
+        </p:nvPicPr>
+        <p:blipFill>
+          <a:blip r:embed="rId4"/>
+          <a:stretch>
+            <a:fillRect/>
+          </a:stretch>
+        </p:blipFill>
+        <p:spPr>
+          <a:xfrm>
+            <a:off x="305423" y="3908132"/>
+            <a:ext cx="11581153" cy="1238626"/>
+          </a:xfrm>
+        </p:spPr>
+      </p:pic>
       <p:sp>
         <p:nvSpPr>
           <p:cNvPr id="23" name="TextBox 22">
@@ -3918,7 +4412,7 @@
         <p:spPr>
           <a:xfrm>
             <a:off x="412634" y="1535015"/>
-            <a:ext cx="11378313" cy="1323439"/>
+            <a:ext cx="11378313" cy="1938992"/>
           </a:xfrm>
           <a:prstGeom prst="rect">
             <a:avLst/>
@@ -3941,17 +4435,165 @@
                   </a:schemeClr>
                 </a:solidFill>
               </a:rPr>
-              <a:t>The ID attribute specifies a unique ID for an element also referred upon from a CSS for styling purposes.</a:t>
+              <a:t>Some tags do not wrap around any content. Therefore, it does not require an accompanying closing tag.</a:t>
+            </a:r>
+          </a:p>
+        </p:txBody>
+      </p:sp>
+    </p:spTree>
+    <p:extLst>
+      <p:ext uri="{BB962C8B-B14F-4D97-AF65-F5344CB8AC3E}">
+        <p14:creationId xmlns:p14="http://schemas.microsoft.com/office/powerpoint/2010/main" val="1664969097"/>
+      </p:ext>
+    </p:extLst>
+  </p:cSld>
+  <p:clrMapOvr>
+    <a:masterClrMapping/>
+  </p:clrMapOvr>
+</p:sld>
+</file>
+
+<file path=ppt/slides/slide12.xml><?xml version="1.0" encoding="utf-8"?>
+<p:sld xmlns:a="http://schemas.openxmlformats.org/drawingml/2006/main" xmlns:r="http://schemas.openxmlformats.org/officeDocument/2006/relationships" xmlns:p="http://schemas.openxmlformats.org/presentationml/2006/main">
+  <p:cSld>
+    <p:spTree>
+      <p:nvGrpSpPr>
+        <p:cNvPr id="1" name=""/>
+        <p:cNvGrpSpPr/>
+        <p:nvPr/>
+      </p:nvGrpSpPr>
+      <p:grpSpPr>
+        <a:xfrm>
+          <a:off x="0" y="0"/>
+          <a:ext cx="0" cy="0"/>
+          <a:chOff x="0" y="0"/>
+          <a:chExt cx="0" cy="0"/>
+        </a:xfrm>
+      </p:grpSpPr>
+      <p:sp>
+        <p:nvSpPr>
+          <p:cNvPr id="8" name="Title 1">
+            <a:extLst>
+              <a:ext uri="{FF2B5EF4-FFF2-40B4-BE49-F238E27FC236}">
+                <a16:creationId xmlns:a16="http://schemas.microsoft.com/office/drawing/2014/main" id="{09918456-B654-4E3D-AC91-FA5269E24FF5}"/>
+              </a:ext>
+            </a:extLst>
+          </p:cNvPr>
+          <p:cNvSpPr>
+            <a:spLocks noGrp="1"/>
+          </p:cNvSpPr>
+          <p:nvPr>
+            <p:ph type="title"/>
+          </p:nvPr>
+        </p:nvSpPr>
+        <p:spPr>
+          <a:xfrm>
+            <a:off x="265062" y="0"/>
+            <a:ext cx="10515600" cy="1325563"/>
+          </a:xfrm>
+        </p:spPr>
+        <p:txBody>
+          <a:bodyPr/>
+          <a:lstStyle/>
+          <a:p>
+            <a:r>
+              <a:rPr lang="en-US" dirty="0">
+                <a:solidFill>
+                  <a:srgbClr val="7030A0"/>
+                </a:solidFill>
+                <a:latin typeface="Segoe UI Light" panose="020B0502040204020203" pitchFamily="34" charset="0"/>
+                <a:cs typeface="Segoe UI Light" panose="020B0502040204020203" pitchFamily="34" charset="0"/>
+              </a:rPr>
+              <a:t>The structure of an HTML element</a:t>
             </a:r>
           </a:p>
         </p:txBody>
       </p:sp>
       <p:pic>
         <p:nvPicPr>
-          <p:cNvPr id="3" name="Picture 2" descr="A close up of a logo&#10;&#10;Description automatically generated">
+          <p:cNvPr id="9" name="Picture 8" descr="A picture containing drawing&#10;&#10;Description automatically generated">
             <a:extLst>
               <a:ext uri="{FF2B5EF4-FFF2-40B4-BE49-F238E27FC236}">
-                <a16:creationId xmlns:a16="http://schemas.microsoft.com/office/drawing/2014/main" id="{12E824D4-871E-4F66-BC9E-6079062CAACC}"/>
+                <a16:creationId xmlns:a16="http://schemas.microsoft.com/office/drawing/2014/main" id="{9E299A5A-76A2-4366-AF75-A534FC1EE59F}"/>
+              </a:ext>
+            </a:extLst>
+          </p:cNvPr>
+          <p:cNvPicPr>
+            <a:picLocks noChangeAspect="1"/>
+          </p:cNvPicPr>
+          <p:nvPr/>
+        </p:nvPicPr>
+        <p:blipFill>
+          <a:blip r:embed="rId3">
+            <a:extLst>
+              <a:ext uri="{28A0092B-C50C-407E-A947-70E740481C1C}">
+                <a14:useLocalDpi xmlns:a14="http://schemas.microsoft.com/office/drawing/2010/main" val="0"/>
+              </a:ext>
+            </a:extLst>
+          </a:blip>
+          <a:stretch>
+            <a:fillRect/>
+          </a:stretch>
+        </p:blipFill>
+        <p:spPr>
+          <a:xfrm>
+            <a:off x="8975842" y="280766"/>
+            <a:ext cx="3080250" cy="820124"/>
+          </a:xfrm>
+          <a:prstGeom prst="rect">
+            <a:avLst/>
+          </a:prstGeom>
+        </p:spPr>
+      </p:pic>
+      <p:sp>
+        <p:nvSpPr>
+          <p:cNvPr id="23" name="TextBox 22">
+            <a:extLst>
+              <a:ext uri="{FF2B5EF4-FFF2-40B4-BE49-F238E27FC236}">
+                <a16:creationId xmlns:a16="http://schemas.microsoft.com/office/drawing/2014/main" id="{54FB7B9D-1F89-42A1-A611-E928CC03DC90}"/>
+              </a:ext>
+            </a:extLst>
+          </p:cNvPr>
+          <p:cNvSpPr txBox="1"/>
+          <p:nvPr/>
+        </p:nvSpPr>
+        <p:spPr>
+          <a:xfrm>
+            <a:off x="412634" y="1535015"/>
+            <a:ext cx="11378313" cy="1323439"/>
+          </a:xfrm>
+          <a:prstGeom prst="rect">
+            <a:avLst/>
+          </a:prstGeom>
+          <a:noFill/>
+        </p:spPr>
+        <p:txBody>
+          <a:bodyPr wrap="square" rtlCol="0">
+            <a:spAutoFit/>
+          </a:bodyPr>
+          <a:lstStyle/>
+          <a:p>
+            <a:pPr algn="ctr"/>
+            <a:r>
+              <a:rPr lang="en-NZ" sz="4000" dirty="0">
+                <a:solidFill>
+                  <a:schemeClr val="tx1">
+                    <a:lumMod val="65000"/>
+                    <a:lumOff val="35000"/>
+                  </a:schemeClr>
+                </a:solidFill>
+              </a:rPr>
+              <a:t>The class attribute specifies the class that the element belongs to and is mostly referred upon from a CSS.</a:t>
+            </a:r>
+          </a:p>
+        </p:txBody>
+      </p:sp>
+      <p:pic>
+        <p:nvPicPr>
+          <p:cNvPr id="11" name="Picture 10" descr="A picture containing sitting, black&#10;&#10;Description automatically generated">
+            <a:extLst>
+              <a:ext uri="{FF2B5EF4-FFF2-40B4-BE49-F238E27FC236}">
+                <a16:creationId xmlns:a16="http://schemas.microsoft.com/office/drawing/2014/main" id="{E1103AF5-815B-4671-BA46-E864F09F3FA9}"/>
               </a:ext>
             </a:extLst>
           </p:cNvPr>
@@ -3974,7 +4616,191 @@
         </p:blipFill>
         <p:spPr>
           <a:xfrm>
-            <a:off x="1571762" y="3292579"/>
+            <a:off x="1214428" y="3429000"/>
+            <a:ext cx="9566234" cy="1689558"/>
+          </a:xfrm>
+          <a:prstGeom prst="rect">
+            <a:avLst/>
+          </a:prstGeom>
+        </p:spPr>
+      </p:pic>
+    </p:spTree>
+    <p:extLst>
+      <p:ext uri="{BB962C8B-B14F-4D97-AF65-F5344CB8AC3E}">
+        <p14:creationId xmlns:p14="http://schemas.microsoft.com/office/powerpoint/2010/main" val="2522116781"/>
+      </p:ext>
+    </p:extLst>
+  </p:cSld>
+  <p:clrMapOvr>
+    <a:masterClrMapping/>
+  </p:clrMapOvr>
+</p:sld>
+</file>
+
+<file path=ppt/slides/slide13.xml><?xml version="1.0" encoding="utf-8"?>
+<p:sld xmlns:a="http://schemas.openxmlformats.org/drawingml/2006/main" xmlns:r="http://schemas.openxmlformats.org/officeDocument/2006/relationships" xmlns:p="http://schemas.openxmlformats.org/presentationml/2006/main">
+  <p:cSld>
+    <p:spTree>
+      <p:nvGrpSpPr>
+        <p:cNvPr id="1" name=""/>
+        <p:cNvGrpSpPr/>
+        <p:nvPr/>
+      </p:nvGrpSpPr>
+      <p:grpSpPr>
+        <a:xfrm>
+          <a:off x="0" y="0"/>
+          <a:ext cx="0" cy="0"/>
+          <a:chOff x="0" y="0"/>
+          <a:chExt cx="0" cy="0"/>
+        </a:xfrm>
+      </p:grpSpPr>
+      <p:sp>
+        <p:nvSpPr>
+          <p:cNvPr id="8" name="Title 1">
+            <a:extLst>
+              <a:ext uri="{FF2B5EF4-FFF2-40B4-BE49-F238E27FC236}">
+                <a16:creationId xmlns:a16="http://schemas.microsoft.com/office/drawing/2014/main" id="{09918456-B654-4E3D-AC91-FA5269E24FF5}"/>
+              </a:ext>
+            </a:extLst>
+          </p:cNvPr>
+          <p:cNvSpPr>
+            <a:spLocks noGrp="1"/>
+          </p:cNvSpPr>
+          <p:nvPr>
+            <p:ph type="title"/>
+          </p:nvPr>
+        </p:nvSpPr>
+        <p:spPr>
+          <a:xfrm>
+            <a:off x="265062" y="0"/>
+            <a:ext cx="10515600" cy="1325563"/>
+          </a:xfrm>
+        </p:spPr>
+        <p:txBody>
+          <a:bodyPr/>
+          <a:lstStyle/>
+          <a:p>
+            <a:r>
+              <a:rPr lang="en-US" dirty="0">
+                <a:solidFill>
+                  <a:srgbClr val="7030A0"/>
+                </a:solidFill>
+                <a:latin typeface="Segoe UI Light" panose="020B0502040204020203" pitchFamily="34" charset="0"/>
+                <a:cs typeface="Segoe UI Light" panose="020B0502040204020203" pitchFamily="34" charset="0"/>
+              </a:rPr>
+              <a:t>The structure of an HTML element</a:t>
+            </a:r>
+          </a:p>
+        </p:txBody>
+      </p:sp>
+      <p:pic>
+        <p:nvPicPr>
+          <p:cNvPr id="9" name="Picture 8" descr="A picture containing drawing&#10;&#10;Description automatically generated">
+            <a:extLst>
+              <a:ext uri="{FF2B5EF4-FFF2-40B4-BE49-F238E27FC236}">
+                <a16:creationId xmlns:a16="http://schemas.microsoft.com/office/drawing/2014/main" id="{9E299A5A-76A2-4366-AF75-A534FC1EE59F}"/>
+              </a:ext>
+            </a:extLst>
+          </p:cNvPr>
+          <p:cNvPicPr>
+            <a:picLocks noChangeAspect="1"/>
+          </p:cNvPicPr>
+          <p:nvPr/>
+        </p:nvPicPr>
+        <p:blipFill>
+          <a:blip r:embed="rId3">
+            <a:extLst>
+              <a:ext uri="{28A0092B-C50C-407E-A947-70E740481C1C}">
+                <a14:useLocalDpi xmlns:a14="http://schemas.microsoft.com/office/drawing/2010/main" val="0"/>
+              </a:ext>
+            </a:extLst>
+          </a:blip>
+          <a:stretch>
+            <a:fillRect/>
+          </a:stretch>
+        </p:blipFill>
+        <p:spPr>
+          <a:xfrm>
+            <a:off x="8975842" y="280766"/>
+            <a:ext cx="3080250" cy="820124"/>
+          </a:xfrm>
+          <a:prstGeom prst="rect">
+            <a:avLst/>
+          </a:prstGeom>
+        </p:spPr>
+      </p:pic>
+      <p:sp>
+        <p:nvSpPr>
+          <p:cNvPr id="23" name="TextBox 22">
+            <a:extLst>
+              <a:ext uri="{FF2B5EF4-FFF2-40B4-BE49-F238E27FC236}">
+                <a16:creationId xmlns:a16="http://schemas.microsoft.com/office/drawing/2014/main" id="{54FB7B9D-1F89-42A1-A611-E928CC03DC90}"/>
+              </a:ext>
+            </a:extLst>
+          </p:cNvPr>
+          <p:cNvSpPr txBox="1"/>
+          <p:nvPr/>
+        </p:nvSpPr>
+        <p:spPr>
+          <a:xfrm>
+            <a:off x="412634" y="1535015"/>
+            <a:ext cx="11378313" cy="1938992"/>
+          </a:xfrm>
+          <a:prstGeom prst="rect">
+            <a:avLst/>
+          </a:prstGeom>
+          <a:noFill/>
+        </p:spPr>
+        <p:txBody>
+          <a:bodyPr wrap="square" rtlCol="0">
+            <a:spAutoFit/>
+          </a:bodyPr>
+          <a:lstStyle/>
+          <a:p>
+            <a:pPr algn="ctr"/>
+            <a:r>
+              <a:rPr lang="en-NZ" sz="4000" dirty="0">
+                <a:solidFill>
+                  <a:schemeClr val="tx1">
+                    <a:lumMod val="65000"/>
+                    <a:lumOff val="35000"/>
+                  </a:schemeClr>
+                </a:solidFill>
+              </a:rPr>
+              <a:t>The ID attribute specifies a unique ID for an element and it is also referred upon from a CSS for styling purposes.</a:t>
+            </a:r>
+          </a:p>
+        </p:txBody>
+      </p:sp>
+      <p:pic>
+        <p:nvPicPr>
+          <p:cNvPr id="3" name="Picture 2" descr="A close up of a logo&#10;&#10;Description automatically generated">
+            <a:extLst>
+              <a:ext uri="{FF2B5EF4-FFF2-40B4-BE49-F238E27FC236}">
+                <a16:creationId xmlns:a16="http://schemas.microsoft.com/office/drawing/2014/main" id="{12E824D4-871E-4F66-BC9E-6079062CAACC}"/>
+              </a:ext>
+            </a:extLst>
+          </p:cNvPr>
+          <p:cNvPicPr>
+            <a:picLocks noChangeAspect="1"/>
+          </p:cNvPicPr>
+          <p:nvPr/>
+        </p:nvPicPr>
+        <p:blipFill>
+          <a:blip r:embed="rId4">
+            <a:extLst>
+              <a:ext uri="{28A0092B-C50C-407E-A947-70E740481C1C}">
+                <a14:useLocalDpi xmlns:a14="http://schemas.microsoft.com/office/drawing/2010/main" val="0"/>
+              </a:ext>
+            </a:extLst>
+          </a:blip>
+          <a:stretch>
+            <a:fillRect/>
+          </a:stretch>
+        </p:blipFill>
+        <p:spPr>
+          <a:xfrm>
+            <a:off x="1571762" y="3429000"/>
             <a:ext cx="9048475" cy="2013404"/>
           </a:xfrm>
           <a:prstGeom prst="rect">
@@ -3995,7 +4821,7 @@
 </p:sld>
 </file>
 
-<file path=ppt/slides/slide12.xml><?xml version="1.0" encoding="utf-8"?>
+<file path=ppt/slides/slide14.xml><?xml version="1.0" encoding="utf-8"?>
 <p:sld xmlns:a="http://schemas.openxmlformats.org/drawingml/2006/main" xmlns:r="http://schemas.openxmlformats.org/officeDocument/2006/relationships" xmlns:p="http://schemas.openxmlformats.org/presentationml/2006/main">
   <p:cSld>
     <p:spTree>
@@ -4252,7 +5078,7 @@
                   <a:srgbClr val="7030A0"/>
                 </a:solidFill>
               </a:rPr>
-              <a:t>What is HTML?</a:t>
+              <a:t>Software</a:t>
             </a:r>
           </a:p>
         </p:txBody>
@@ -4293,12 +5119,48 @@
           </a:prstGeom>
         </p:spPr>
       </p:pic>
-      <p:sp>
-        <p:nvSpPr>
-          <p:cNvPr id="6" name="TextBox 5">
+      <p:pic>
+        <p:nvPicPr>
+          <p:cNvPr id="3" name="Picture 2" descr="A close up of a logo&#10;&#10;Description automatically generated">
             <a:extLst>
               <a:ext uri="{FF2B5EF4-FFF2-40B4-BE49-F238E27FC236}">
-                <a16:creationId xmlns:a16="http://schemas.microsoft.com/office/drawing/2014/main" id="{6D35BF25-20E9-4973-835E-C306E7A2054E}"/>
+                <a16:creationId xmlns:a16="http://schemas.microsoft.com/office/drawing/2014/main" id="{161035E0-B431-4E1E-9195-92EC258C9ACC}"/>
+              </a:ext>
+            </a:extLst>
+          </p:cNvPr>
+          <p:cNvPicPr>
+            <a:picLocks noChangeAspect="1"/>
+          </p:cNvPicPr>
+          <p:nvPr/>
+        </p:nvPicPr>
+        <p:blipFill>
+          <a:blip r:embed="rId3">
+            <a:extLst>
+              <a:ext uri="{28A0092B-C50C-407E-A947-70E740481C1C}">
+                <a14:useLocalDpi xmlns:a14="http://schemas.microsoft.com/office/drawing/2010/main" val="0"/>
+              </a:ext>
+            </a:extLst>
+          </a:blip>
+          <a:stretch>
+            <a:fillRect/>
+          </a:stretch>
+        </p:blipFill>
+        <p:spPr>
+          <a:xfrm>
+            <a:off x="2230798" y="1345916"/>
+            <a:ext cx="1919901" cy="1919901"/>
+          </a:xfrm>
+          <a:prstGeom prst="rect">
+            <a:avLst/>
+          </a:prstGeom>
+        </p:spPr>
+      </p:pic>
+      <p:sp>
+        <p:nvSpPr>
+          <p:cNvPr id="7" name="TextBox 6">
+            <a:extLst>
+              <a:ext uri="{FF2B5EF4-FFF2-40B4-BE49-F238E27FC236}">
+                <a16:creationId xmlns:a16="http://schemas.microsoft.com/office/drawing/2014/main" id="{D256152A-CCC4-4CCB-A4DF-2D1D482F362D}"/>
               </a:ext>
             </a:extLst>
           </p:cNvPr>
@@ -4307,8 +5169,8 @@
         </p:nvSpPr>
         <p:spPr>
           <a:xfrm>
-            <a:off x="412634" y="1535015"/>
-            <a:ext cx="11378313" cy="3785652"/>
+            <a:off x="5416149" y="1951923"/>
+            <a:ext cx="4267650" cy="707886"/>
           </a:xfrm>
           <a:prstGeom prst="rect">
             <a:avLst/>
@@ -4321,10 +5183,6 @@
           </a:bodyPr>
           <a:lstStyle/>
           <a:p>
-            <a:pPr marL="571500" indent="-571500">
-              <a:buFont typeface="Arial" panose="020B0604020202020204" pitchFamily="34" charset="0"/>
-              <a:buChar char="•"/>
-            </a:pPr>
             <a:r>
               <a:rPr lang="en-NZ" sz="4000" dirty="0">
                 <a:solidFill>
@@ -4334,19 +5192,75 @@
                   </a:schemeClr>
                 </a:solidFill>
               </a:rPr>
-              <a:t>HTML stands for Hypertext </a:t>
-            </a:r>
-            <a:r>
-              <a:rPr lang="en-NZ" sz="4000" dirty="0" err="1">
-                <a:solidFill>
-                  <a:schemeClr val="tx1">
-                    <a:lumMod val="65000"/>
-                    <a:lumOff val="35000"/>
-                  </a:schemeClr>
-                </a:solidFill>
-              </a:rPr>
-              <a:t>Markup</a:t>
-            </a:r>
+              <a:t>Visual Studio Code</a:t>
+            </a:r>
+          </a:p>
+        </p:txBody>
+      </p:sp>
+      <p:pic>
+        <p:nvPicPr>
+          <p:cNvPr id="9" name="Picture 8" descr="A picture containing graphics, device, drawing&#10;&#10;Description automatically generated">
+            <a:extLst>
+              <a:ext uri="{FF2B5EF4-FFF2-40B4-BE49-F238E27FC236}">
+                <a16:creationId xmlns:a16="http://schemas.microsoft.com/office/drawing/2014/main" id="{351DB524-A5E6-408A-A986-CE7114328B86}"/>
+              </a:ext>
+            </a:extLst>
+          </p:cNvPr>
+          <p:cNvPicPr>
+            <a:picLocks noChangeAspect="1"/>
+          </p:cNvPicPr>
+          <p:nvPr/>
+        </p:nvPicPr>
+        <p:blipFill>
+          <a:blip r:embed="rId4">
+            <a:extLst>
+              <a:ext uri="{28A0092B-C50C-407E-A947-70E740481C1C}">
+                <a14:useLocalDpi xmlns:a14="http://schemas.microsoft.com/office/drawing/2010/main" val="0"/>
+              </a:ext>
+            </a:extLst>
+          </a:blip>
+          <a:stretch>
+            <a:fillRect/>
+          </a:stretch>
+        </p:blipFill>
+        <p:spPr>
+          <a:xfrm>
+            <a:off x="2230798" y="3752399"/>
+            <a:ext cx="1919901" cy="1919901"/>
+          </a:xfrm>
+          <a:prstGeom prst="rect">
+            <a:avLst/>
+          </a:prstGeom>
+        </p:spPr>
+      </p:pic>
+      <p:sp>
+        <p:nvSpPr>
+          <p:cNvPr id="10" name="TextBox 9">
+            <a:extLst>
+              <a:ext uri="{FF2B5EF4-FFF2-40B4-BE49-F238E27FC236}">
+                <a16:creationId xmlns:a16="http://schemas.microsoft.com/office/drawing/2014/main" id="{3126B990-C11A-4A44-B054-619657DE995C}"/>
+              </a:ext>
+            </a:extLst>
+          </p:cNvPr>
+          <p:cNvSpPr txBox="1"/>
+          <p:nvPr/>
+        </p:nvSpPr>
+        <p:spPr>
+          <a:xfrm>
+            <a:off x="5416149" y="4183980"/>
+            <a:ext cx="3902512" cy="707886"/>
+          </a:xfrm>
+          <a:prstGeom prst="rect">
+            <a:avLst/>
+          </a:prstGeom>
+          <a:noFill/>
+        </p:spPr>
+        <p:txBody>
+          <a:bodyPr wrap="square" rtlCol="0">
+            <a:spAutoFit/>
+          </a:bodyPr>
+          <a:lstStyle/>
+          <a:p>
             <a:r>
               <a:rPr lang="en-NZ" sz="4000" dirty="0">
                 <a:solidFill>
@@ -4356,41 +5270,7 @@
                   </a:schemeClr>
                 </a:solidFill>
               </a:rPr>
-              <a:t> Language.</a:t>
-            </a:r>
-          </a:p>
-          <a:p>
-            <a:pPr marL="571500" indent="-571500">
-              <a:buFont typeface="Arial" panose="020B0604020202020204" pitchFamily="34" charset="0"/>
-              <a:buChar char="•"/>
-            </a:pPr>
-            <a:r>
-              <a:rPr lang="en-NZ" sz="4000" dirty="0">
-                <a:solidFill>
-                  <a:schemeClr val="tx1">
-                    <a:lumMod val="65000"/>
-                    <a:lumOff val="35000"/>
-                  </a:schemeClr>
-                </a:solidFill>
-              </a:rPr>
-              <a:t>HTML is the mark up language that defines the webpage’s content.</a:t>
-            </a:r>
-          </a:p>
-          <a:p>
-            <a:pPr marL="571500" indent="-571500">
-              <a:buFont typeface="Arial" panose="020B0604020202020204" pitchFamily="34" charset="0"/>
-              <a:buChar char="•"/>
-            </a:pPr>
-            <a:r>
-              <a:rPr lang="en-NZ" sz="4000" dirty="0">
-                <a:solidFill>
-                  <a:schemeClr val="tx1">
-                    <a:lumMod val="65000"/>
-                    <a:lumOff val="35000"/>
-                  </a:schemeClr>
-                </a:solidFill>
-              </a:rPr>
-              <a:t>HTML consists of a series of elements which use opening and closing tags to define how the content of the webpage should appear and behave.</a:t>
+              <a:t>Internet Browser</a:t>
             </a:r>
           </a:p>
         </p:txBody>
@@ -4427,49 +5307,66 @@
       </p:grpSpPr>
       <p:sp>
         <p:nvSpPr>
-          <p:cNvPr id="5" name="Title 1">
+          <p:cNvPr id="4" name="Title 1">
             <a:extLst>
               <a:ext uri="{FF2B5EF4-FFF2-40B4-BE49-F238E27FC236}">
-                <a16:creationId xmlns:a16="http://schemas.microsoft.com/office/drawing/2014/main" id="{1D3EF649-C900-47FE-8021-FD2E41BCA88C}"/>
+                <a16:creationId xmlns:a16="http://schemas.microsoft.com/office/drawing/2014/main" id="{B3C7A79F-AD5F-4A40-AB17-D2528E972419}"/>
               </a:ext>
             </a:extLst>
           </p:cNvPr>
-          <p:cNvSpPr>
-            <a:spLocks noGrp="1"/>
-          </p:cNvSpPr>
-          <p:nvPr>
-            <p:ph type="title"/>
-          </p:nvPr>
-        </p:nvSpPr>
-        <p:spPr>
-          <a:xfrm>
-            <a:off x="135908" y="0"/>
-            <a:ext cx="5735503" cy="1325563"/>
-          </a:xfrm>
+          <p:cNvSpPr txBox="1">
+            <a:spLocks/>
+          </p:cNvSpPr>
+          <p:nvPr/>
+        </p:nvSpPr>
+        <p:spPr>
+          <a:xfrm>
+            <a:off x="135908" y="393003"/>
+            <a:ext cx="4544376" cy="707887"/>
+          </a:xfrm>
+          <a:prstGeom prst="rect">
+            <a:avLst/>
+          </a:prstGeom>
         </p:spPr>
         <p:txBody>
           <a:bodyPr/>
-          <a:lstStyle/>
+          <a:lstStyle>
+            <a:lvl1pPr algn="l" defTabSz="914400" rtl="0" eaLnBrk="1" latinLnBrk="0" hangingPunct="1">
+              <a:lnSpc>
+                <a:spcPct val="90000"/>
+              </a:lnSpc>
+              <a:spcBef>
+                <a:spcPct val="0"/>
+              </a:spcBef>
+              <a:buNone/>
+              <a:defRPr sz="4400" kern="1200">
+                <a:solidFill>
+                  <a:schemeClr val="tx1"/>
+                </a:solidFill>
+                <a:latin typeface="Segoe UI Light" panose="020B0502040204020203" pitchFamily="34" charset="0"/>
+                <a:ea typeface="+mj-ea"/>
+                <a:cs typeface="Segoe UI Light" panose="020B0502040204020203" pitchFamily="34" charset="0"/>
+              </a:defRPr>
+            </a:lvl1pPr>
+          </a:lstStyle>
           <a:p>
             <a:r>
               <a:rPr lang="en-US" dirty="0">
                 <a:solidFill>
                   <a:srgbClr val="7030A0"/>
                 </a:solidFill>
-                <a:latin typeface="Segoe UI Light" panose="020B0502040204020203" pitchFamily="34" charset="0"/>
-                <a:cs typeface="Segoe UI Light" panose="020B0502040204020203" pitchFamily="34" charset="0"/>
               </a:rPr>
-              <a:t>The structure of HTML</a:t>
+              <a:t>What is HTML?</a:t>
             </a:r>
           </a:p>
         </p:txBody>
       </p:sp>
       <p:pic>
         <p:nvPicPr>
-          <p:cNvPr id="6" name="Picture 5" descr="A picture containing drawing&#10;&#10;Description automatically generated">
+          <p:cNvPr id="5" name="Picture 4" descr="A picture containing drawing&#10;&#10;Description automatically generated">
             <a:extLst>
               <a:ext uri="{FF2B5EF4-FFF2-40B4-BE49-F238E27FC236}">
-                <a16:creationId xmlns:a16="http://schemas.microsoft.com/office/drawing/2014/main" id="{A3DA1DE4-6CDE-48C1-A274-8E9AF8E45C8C}"/>
+                <a16:creationId xmlns:a16="http://schemas.microsoft.com/office/drawing/2014/main" id="{1DC23D56-E23D-4805-97DB-DEF341EE45A9}"/>
               </a:ext>
             </a:extLst>
           </p:cNvPr>
@@ -4479,7 +5376,7 @@
           <p:nvPr/>
         </p:nvPicPr>
         <p:blipFill>
-          <a:blip r:embed="rId3">
+          <a:blip r:embed="rId2">
             <a:extLst>
               <a:ext uri="{28A0092B-C50C-407E-A947-70E740481C1C}">
                 <a14:useLocalDpi xmlns:a14="http://schemas.microsoft.com/office/drawing/2010/main" val="0"/>
@@ -4500,40 +5397,112 @@
           </a:prstGeom>
         </p:spPr>
       </p:pic>
-      <p:pic>
-        <p:nvPicPr>
-          <p:cNvPr id="8" name="Picture 7">
+      <p:sp>
+        <p:nvSpPr>
+          <p:cNvPr id="6" name="TextBox 5">
             <a:extLst>
               <a:ext uri="{FF2B5EF4-FFF2-40B4-BE49-F238E27FC236}">
-                <a16:creationId xmlns:a16="http://schemas.microsoft.com/office/drawing/2014/main" id="{FEAB92BB-DBC2-4668-8E0D-B313B8B24C09}"/>
+                <a16:creationId xmlns:a16="http://schemas.microsoft.com/office/drawing/2014/main" id="{6D35BF25-20E9-4973-835E-C306E7A2054E}"/>
               </a:ext>
             </a:extLst>
           </p:cNvPr>
-          <p:cNvPicPr>
-            <a:picLocks noChangeAspect="1"/>
-          </p:cNvPicPr>
+          <p:cNvSpPr txBox="1"/>
           <p:nvPr/>
-        </p:nvPicPr>
-        <p:blipFill>
-          <a:blip r:embed="rId4"/>
-          <a:stretch>
-            <a:fillRect/>
-          </a:stretch>
-        </p:blipFill>
-        <p:spPr>
-          <a:xfrm>
-            <a:off x="0" y="1777511"/>
-            <a:ext cx="12192000" cy="3014220"/>
+        </p:nvSpPr>
+        <p:spPr>
+          <a:xfrm>
+            <a:off x="412634" y="1535015"/>
+            <a:ext cx="11378313" cy="3785652"/>
           </a:xfrm>
           <a:prstGeom prst="rect">
             <a:avLst/>
           </a:prstGeom>
-        </p:spPr>
-      </p:pic>
+          <a:noFill/>
+        </p:spPr>
+        <p:txBody>
+          <a:bodyPr wrap="square" rtlCol="0">
+            <a:spAutoFit/>
+          </a:bodyPr>
+          <a:lstStyle/>
+          <a:p>
+            <a:pPr marL="571500" indent="-571500">
+              <a:buFont typeface="Arial" panose="020B0604020202020204" pitchFamily="34" charset="0"/>
+              <a:buChar char="•"/>
+            </a:pPr>
+            <a:r>
+              <a:rPr lang="en-NZ" sz="4000" dirty="0">
+                <a:solidFill>
+                  <a:schemeClr val="tx1">
+                    <a:lumMod val="65000"/>
+                    <a:lumOff val="35000"/>
+                  </a:schemeClr>
+                </a:solidFill>
+              </a:rPr>
+              <a:t>HTML stands for Hypertext </a:t>
+            </a:r>
+            <a:r>
+              <a:rPr lang="en-NZ" sz="4000" dirty="0" err="1">
+                <a:solidFill>
+                  <a:schemeClr val="tx1">
+                    <a:lumMod val="65000"/>
+                    <a:lumOff val="35000"/>
+                  </a:schemeClr>
+                </a:solidFill>
+              </a:rPr>
+              <a:t>Markup</a:t>
+            </a:r>
+            <a:r>
+              <a:rPr lang="en-NZ" sz="4000" dirty="0">
+                <a:solidFill>
+                  <a:schemeClr val="tx1">
+                    <a:lumMod val="65000"/>
+                    <a:lumOff val="35000"/>
+                  </a:schemeClr>
+                </a:solidFill>
+              </a:rPr>
+              <a:t> Language.</a:t>
+            </a:r>
+          </a:p>
+          <a:p>
+            <a:pPr marL="571500" indent="-571500">
+              <a:buFont typeface="Arial" panose="020B0604020202020204" pitchFamily="34" charset="0"/>
+              <a:buChar char="•"/>
+            </a:pPr>
+            <a:r>
+              <a:rPr lang="en-NZ" sz="4000" dirty="0">
+                <a:solidFill>
+                  <a:schemeClr val="tx1">
+                    <a:lumMod val="65000"/>
+                    <a:lumOff val="35000"/>
+                  </a:schemeClr>
+                </a:solidFill>
+              </a:rPr>
+              <a:t>HTML is the mark up language that defines the webpage’s content.</a:t>
+            </a:r>
+          </a:p>
+          <a:p>
+            <a:pPr marL="571500" indent="-571500">
+              <a:buFont typeface="Arial" panose="020B0604020202020204" pitchFamily="34" charset="0"/>
+              <a:buChar char="•"/>
+            </a:pPr>
+            <a:r>
+              <a:rPr lang="en-NZ" sz="4000" dirty="0">
+                <a:solidFill>
+                  <a:schemeClr val="tx1">
+                    <a:lumMod val="65000"/>
+                    <a:lumOff val="35000"/>
+                  </a:schemeClr>
+                </a:solidFill>
+              </a:rPr>
+              <a:t>HTML consists of a series of elements which use opening and closing tags to define how the content of the webpage should appear and behave.</a:t>
+            </a:r>
+          </a:p>
+        </p:txBody>
+      </p:sp>
     </p:spTree>
     <p:extLst>
       <p:ext uri="{BB962C8B-B14F-4D97-AF65-F5344CB8AC3E}">
-        <p14:creationId xmlns:p14="http://schemas.microsoft.com/office/powerpoint/2010/main" val="4276440291"/>
+        <p14:creationId xmlns:p14="http://schemas.microsoft.com/office/powerpoint/2010/main" val="685940017"/>
       </p:ext>
     </p:extLst>
   </p:cSld>
@@ -4562,10 +5531,10 @@
       </p:grpSpPr>
       <p:sp>
         <p:nvSpPr>
-          <p:cNvPr id="7" name="Title 1">
+          <p:cNvPr id="5" name="Title 1">
             <a:extLst>
               <a:ext uri="{FF2B5EF4-FFF2-40B4-BE49-F238E27FC236}">
-                <a16:creationId xmlns:a16="http://schemas.microsoft.com/office/drawing/2014/main" id="{80300B8D-C313-416D-833A-7B83B568C627}"/>
+                <a16:creationId xmlns:a16="http://schemas.microsoft.com/office/drawing/2014/main" id="{1D3EF649-C900-47FE-8021-FD2E41BCA88C}"/>
               </a:ext>
             </a:extLst>
           </p:cNvPr>
@@ -4579,7 +5548,7 @@
         <p:spPr>
           <a:xfrm>
             <a:off x="135908" y="0"/>
-            <a:ext cx="5615187" cy="1325563"/>
+            <a:ext cx="5735503" cy="1325563"/>
           </a:xfrm>
         </p:spPr>
         <p:txBody>
@@ -4601,10 +5570,10 @@
       </p:sp>
       <p:pic>
         <p:nvPicPr>
-          <p:cNvPr id="8" name="Picture 7" descr="A picture containing drawing&#10;&#10;Description automatically generated">
+          <p:cNvPr id="6" name="Picture 5" descr="A picture containing drawing&#10;&#10;Description automatically generated">
             <a:extLst>
               <a:ext uri="{FF2B5EF4-FFF2-40B4-BE49-F238E27FC236}">
-                <a16:creationId xmlns:a16="http://schemas.microsoft.com/office/drawing/2014/main" id="{1DC6C6F6-3440-45F5-AD3E-3D1642CEC6D6}"/>
+                <a16:creationId xmlns:a16="http://schemas.microsoft.com/office/drawing/2014/main" id="{A3DA1DE4-6CDE-48C1-A274-8E9AF8E45C8C}"/>
               </a:ext>
             </a:extLst>
           </p:cNvPr>
@@ -4637,10 +5606,10 @@
       </p:pic>
       <p:pic>
         <p:nvPicPr>
-          <p:cNvPr id="10" name="Picture 9">
+          <p:cNvPr id="8" name="Picture 7">
             <a:extLst>
               <a:ext uri="{FF2B5EF4-FFF2-40B4-BE49-F238E27FC236}">
-                <a16:creationId xmlns:a16="http://schemas.microsoft.com/office/drawing/2014/main" id="{79AD5B37-FB27-4EC1-AE4C-D0FB5A2B2699}"/>
+                <a16:creationId xmlns:a16="http://schemas.microsoft.com/office/drawing/2014/main" id="{FEAB92BB-DBC2-4668-8E0D-B313B8B24C09}"/>
               </a:ext>
             </a:extLst>
           </p:cNvPr>
@@ -4657,8 +5626,8 @@
         </p:blipFill>
         <p:spPr>
           <a:xfrm>
-            <a:off x="0" y="1926090"/>
-            <a:ext cx="12192000" cy="2585752"/>
+            <a:off x="0" y="1777511"/>
+            <a:ext cx="12192000" cy="3014220"/>
           </a:xfrm>
           <a:prstGeom prst="rect">
             <a:avLst/>
@@ -4668,7 +5637,7 @@
     </p:spTree>
     <p:extLst>
       <p:ext uri="{BB962C8B-B14F-4D97-AF65-F5344CB8AC3E}">
-        <p14:creationId xmlns:p14="http://schemas.microsoft.com/office/powerpoint/2010/main" val="3092160222"/>
+        <p14:creationId xmlns:p14="http://schemas.microsoft.com/office/powerpoint/2010/main" val="4276440291"/>
       </p:ext>
     </p:extLst>
   </p:cSld>
@@ -4772,10 +5741,10 @@
       </p:pic>
       <p:pic>
         <p:nvPicPr>
-          <p:cNvPr id="5" name="Picture 4">
+          <p:cNvPr id="10" name="Picture 9">
             <a:extLst>
               <a:ext uri="{FF2B5EF4-FFF2-40B4-BE49-F238E27FC236}">
-                <a16:creationId xmlns:a16="http://schemas.microsoft.com/office/drawing/2014/main" id="{FC046377-8238-4D2F-804A-1318CD20B07F}"/>
+                <a16:creationId xmlns:a16="http://schemas.microsoft.com/office/drawing/2014/main" id="{79AD5B37-FB27-4EC1-AE4C-D0FB5A2B2699}"/>
               </a:ext>
             </a:extLst>
           </p:cNvPr>
@@ -4792,8 +5761,8 @@
         </p:blipFill>
         <p:spPr>
           <a:xfrm>
-            <a:off x="1390741" y="1841500"/>
-            <a:ext cx="9220200" cy="3175000"/>
+            <a:off x="0" y="1926090"/>
+            <a:ext cx="12192000" cy="2585752"/>
           </a:xfrm>
           <a:prstGeom prst="rect">
             <a:avLst/>
@@ -4803,7 +5772,7 @@
     </p:spTree>
     <p:extLst>
       <p:ext uri="{BB962C8B-B14F-4D97-AF65-F5344CB8AC3E}">
-        <p14:creationId xmlns:p14="http://schemas.microsoft.com/office/powerpoint/2010/main" val="2245017979"/>
+        <p14:creationId xmlns:p14="http://schemas.microsoft.com/office/powerpoint/2010/main" val="3092160222"/>
       </p:ext>
     </p:extLst>
   </p:cSld>
@@ -4832,10 +5801,10 @@
       </p:grpSpPr>
       <p:sp>
         <p:nvSpPr>
-          <p:cNvPr id="8" name="Title 1">
+          <p:cNvPr id="7" name="Title 1">
             <a:extLst>
               <a:ext uri="{FF2B5EF4-FFF2-40B4-BE49-F238E27FC236}">
-                <a16:creationId xmlns:a16="http://schemas.microsoft.com/office/drawing/2014/main" id="{09918456-B654-4E3D-AC91-FA5269E24FF5}"/>
+                <a16:creationId xmlns:a16="http://schemas.microsoft.com/office/drawing/2014/main" id="{80300B8D-C313-416D-833A-7B83B568C627}"/>
               </a:ext>
             </a:extLst>
           </p:cNvPr>
@@ -4848,8 +5817,8 @@
         </p:nvSpPr>
         <p:spPr>
           <a:xfrm>
-            <a:off x="265062" y="0"/>
-            <a:ext cx="10515600" cy="1325563"/>
+            <a:off x="135908" y="0"/>
+            <a:ext cx="5615187" cy="1325563"/>
           </a:xfrm>
         </p:spPr>
         <p:txBody>
@@ -4871,10 +5840,10 @@
       </p:sp>
       <p:pic>
         <p:nvPicPr>
-          <p:cNvPr id="9" name="Picture 8" descr="A picture containing drawing&#10;&#10;Description automatically generated">
+          <p:cNvPr id="8" name="Picture 7" descr="A picture containing drawing&#10;&#10;Description automatically generated">
             <a:extLst>
               <a:ext uri="{FF2B5EF4-FFF2-40B4-BE49-F238E27FC236}">
-                <a16:creationId xmlns:a16="http://schemas.microsoft.com/office/drawing/2014/main" id="{9E299A5A-76A2-4366-AF75-A534FC1EE59F}"/>
+                <a16:creationId xmlns:a16="http://schemas.microsoft.com/office/drawing/2014/main" id="{1DC6C6F6-3440-45F5-AD3E-3D1642CEC6D6}"/>
               </a:ext>
             </a:extLst>
           </p:cNvPr>
@@ -4907,10 +5876,10 @@
       </p:pic>
       <p:pic>
         <p:nvPicPr>
-          <p:cNvPr id="11" name="Picture 10">
+          <p:cNvPr id="5" name="Picture 4">
             <a:extLst>
               <a:ext uri="{FF2B5EF4-FFF2-40B4-BE49-F238E27FC236}">
-                <a16:creationId xmlns:a16="http://schemas.microsoft.com/office/drawing/2014/main" id="{09751366-2268-48B0-9B6F-C91AAA8DBB17}"/>
+                <a16:creationId xmlns:a16="http://schemas.microsoft.com/office/drawing/2014/main" id="{FC046377-8238-4D2F-804A-1318CD20B07F}"/>
               </a:ext>
             </a:extLst>
           </p:cNvPr>
@@ -4927,8 +5896,8 @@
         </p:blipFill>
         <p:spPr>
           <a:xfrm>
-            <a:off x="0" y="2333087"/>
-            <a:ext cx="12192000" cy="1964632"/>
+            <a:off x="1390741" y="1841500"/>
+            <a:ext cx="9220200" cy="3175000"/>
           </a:xfrm>
           <a:prstGeom prst="rect">
             <a:avLst/>
@@ -4938,7 +5907,7 @@
     </p:spTree>
     <p:extLst>
       <p:ext uri="{BB962C8B-B14F-4D97-AF65-F5344CB8AC3E}">
-        <p14:creationId xmlns:p14="http://schemas.microsoft.com/office/powerpoint/2010/main" val="1074578404"/>
+        <p14:creationId xmlns:p14="http://schemas.microsoft.com/office/powerpoint/2010/main" val="2245017979"/>
       </p:ext>
     </p:extLst>
   </p:cSld>
@@ -5042,10 +6011,10 @@
       </p:pic>
       <p:pic>
         <p:nvPicPr>
-          <p:cNvPr id="5" name="Picture 4">
+          <p:cNvPr id="11" name="Picture 10">
             <a:extLst>
               <a:ext uri="{FF2B5EF4-FFF2-40B4-BE49-F238E27FC236}">
-                <a16:creationId xmlns:a16="http://schemas.microsoft.com/office/drawing/2014/main" id="{D2898EB7-C4BA-42C3-957D-3D245C1E68F9}"/>
+                <a16:creationId xmlns:a16="http://schemas.microsoft.com/office/drawing/2014/main" id="{09751366-2268-48B0-9B6F-C91AAA8DBB17}"/>
               </a:ext>
             </a:extLst>
           </p:cNvPr>
@@ -5062,90 +6031,18 @@
         </p:blipFill>
         <p:spPr>
           <a:xfrm>
-            <a:off x="1002028" y="1470957"/>
-            <a:ext cx="9894270" cy="3060490"/>
+            <a:off x="0" y="2333087"/>
+            <a:ext cx="12192000" cy="1964632"/>
           </a:xfrm>
           <a:prstGeom prst="rect">
             <a:avLst/>
           </a:prstGeom>
         </p:spPr>
       </p:pic>
-      <p:pic>
-        <p:nvPicPr>
-          <p:cNvPr id="6" name="Picture 5">
-            <a:extLst>
-              <a:ext uri="{FF2B5EF4-FFF2-40B4-BE49-F238E27FC236}">
-                <a16:creationId xmlns:a16="http://schemas.microsoft.com/office/drawing/2014/main" id="{A23C7646-29E6-4D94-87DF-21994E380960}"/>
-              </a:ext>
-            </a:extLst>
-          </p:cNvPr>
-          <p:cNvPicPr>
-            <a:picLocks noChangeAspect="1"/>
-          </p:cNvPicPr>
-          <p:nvPr/>
-        </p:nvPicPr>
-        <p:blipFill>
-          <a:blip r:embed="rId5"/>
-          <a:stretch>
-            <a:fillRect/>
-          </a:stretch>
-        </p:blipFill>
-        <p:spPr>
-          <a:xfrm>
-            <a:off x="1002028" y="4901514"/>
-            <a:ext cx="3556000" cy="889000"/>
-          </a:xfrm>
-          <a:prstGeom prst="rect">
-            <a:avLst/>
-          </a:prstGeom>
-        </p:spPr>
-      </p:pic>
-      <p:sp>
-        <p:nvSpPr>
-          <p:cNvPr id="10" name="TextBox 9">
-            <a:extLst>
-              <a:ext uri="{FF2B5EF4-FFF2-40B4-BE49-F238E27FC236}">
-                <a16:creationId xmlns:a16="http://schemas.microsoft.com/office/drawing/2014/main" id="{74E8D54B-2299-49A9-8F73-CC9045C77608}"/>
-              </a:ext>
-            </a:extLst>
-          </p:cNvPr>
-          <p:cNvSpPr txBox="1"/>
-          <p:nvPr/>
-        </p:nvSpPr>
-        <p:spPr>
-          <a:xfrm>
-            <a:off x="4924477" y="4901514"/>
-            <a:ext cx="6734123" cy="830997"/>
-          </a:xfrm>
-          <a:prstGeom prst="rect">
-            <a:avLst/>
-          </a:prstGeom>
-          <a:noFill/>
-        </p:spPr>
-        <p:txBody>
-          <a:bodyPr wrap="square" rtlCol="0">
-            <a:spAutoFit/>
-          </a:bodyPr>
-          <a:lstStyle/>
-          <a:p>
-            <a:r>
-              <a:rPr lang="en-NZ" sz="2400" dirty="0">
-                <a:solidFill>
-                  <a:schemeClr val="tx1">
-                    <a:lumMod val="65000"/>
-                    <a:lumOff val="35000"/>
-                  </a:schemeClr>
-                </a:solidFill>
-              </a:rPr>
-              <a:t>The content that you put as the title is also where the webpage gets its tab name from.</a:t>
-            </a:r>
-          </a:p>
-        </p:txBody>
-      </p:sp>
     </p:spTree>
     <p:extLst>
       <p:ext uri="{BB962C8B-B14F-4D97-AF65-F5344CB8AC3E}">
-        <p14:creationId xmlns:p14="http://schemas.microsoft.com/office/powerpoint/2010/main" val="208906430"/>
+        <p14:creationId xmlns:p14="http://schemas.microsoft.com/office/powerpoint/2010/main" val="1074578404"/>
       </p:ext>
     </p:extLst>
   </p:cSld>
@@ -5249,10 +6146,10 @@
       </p:pic>
       <p:pic>
         <p:nvPicPr>
-          <p:cNvPr id="7" name="Picture 6">
+          <p:cNvPr id="5" name="Picture 4">
             <a:extLst>
               <a:ext uri="{FF2B5EF4-FFF2-40B4-BE49-F238E27FC236}">
-                <a16:creationId xmlns:a16="http://schemas.microsoft.com/office/drawing/2014/main" id="{002BB93D-092E-4EBC-B9F2-BA1304D240FF}"/>
+                <a16:creationId xmlns:a16="http://schemas.microsoft.com/office/drawing/2014/main" id="{D2898EB7-C4BA-42C3-957D-3D245C1E68F9}"/>
               </a:ext>
             </a:extLst>
           </p:cNvPr>
@@ -5269,18 +6166,90 @@
         </p:blipFill>
         <p:spPr>
           <a:xfrm>
-            <a:off x="0" y="1687011"/>
-            <a:ext cx="12207532" cy="3483978"/>
+            <a:off x="1002028" y="1470957"/>
+            <a:ext cx="9894270" cy="3060490"/>
           </a:xfrm>
           <a:prstGeom prst="rect">
             <a:avLst/>
           </a:prstGeom>
         </p:spPr>
       </p:pic>
+      <p:pic>
+        <p:nvPicPr>
+          <p:cNvPr id="6" name="Picture 5">
+            <a:extLst>
+              <a:ext uri="{FF2B5EF4-FFF2-40B4-BE49-F238E27FC236}">
+                <a16:creationId xmlns:a16="http://schemas.microsoft.com/office/drawing/2014/main" id="{A23C7646-29E6-4D94-87DF-21994E380960}"/>
+              </a:ext>
+            </a:extLst>
+          </p:cNvPr>
+          <p:cNvPicPr>
+            <a:picLocks noChangeAspect="1"/>
+          </p:cNvPicPr>
+          <p:nvPr/>
+        </p:nvPicPr>
+        <p:blipFill>
+          <a:blip r:embed="rId5"/>
+          <a:stretch>
+            <a:fillRect/>
+          </a:stretch>
+        </p:blipFill>
+        <p:spPr>
+          <a:xfrm>
+            <a:off x="1002028" y="4901514"/>
+            <a:ext cx="3556000" cy="889000"/>
+          </a:xfrm>
+          <a:prstGeom prst="rect">
+            <a:avLst/>
+          </a:prstGeom>
+        </p:spPr>
+      </p:pic>
+      <p:sp>
+        <p:nvSpPr>
+          <p:cNvPr id="10" name="TextBox 9">
+            <a:extLst>
+              <a:ext uri="{FF2B5EF4-FFF2-40B4-BE49-F238E27FC236}">
+                <a16:creationId xmlns:a16="http://schemas.microsoft.com/office/drawing/2014/main" id="{74E8D54B-2299-49A9-8F73-CC9045C77608}"/>
+              </a:ext>
+            </a:extLst>
+          </p:cNvPr>
+          <p:cNvSpPr txBox="1"/>
+          <p:nvPr/>
+        </p:nvSpPr>
+        <p:spPr>
+          <a:xfrm>
+            <a:off x="4924477" y="4901514"/>
+            <a:ext cx="6734123" cy="830997"/>
+          </a:xfrm>
+          <a:prstGeom prst="rect">
+            <a:avLst/>
+          </a:prstGeom>
+          <a:noFill/>
+        </p:spPr>
+        <p:txBody>
+          <a:bodyPr wrap="square" rtlCol="0">
+            <a:spAutoFit/>
+          </a:bodyPr>
+          <a:lstStyle/>
+          <a:p>
+            <a:r>
+              <a:rPr lang="en-NZ" sz="2400" dirty="0">
+                <a:solidFill>
+                  <a:schemeClr val="tx1">
+                    <a:lumMod val="65000"/>
+                    <a:lumOff val="35000"/>
+                  </a:schemeClr>
+                </a:solidFill>
+              </a:rPr>
+              <a:t>The content that you put as the title is also where the webpage gets its tab name from.</a:t>
+            </a:r>
+          </a:p>
+        </p:txBody>
+      </p:sp>
     </p:spTree>
     <p:extLst>
       <p:ext uri="{BB962C8B-B14F-4D97-AF65-F5344CB8AC3E}">
-        <p14:creationId xmlns:p14="http://schemas.microsoft.com/office/powerpoint/2010/main" val="3564564786"/>
+        <p14:creationId xmlns:p14="http://schemas.microsoft.com/office/powerpoint/2010/main" val="208906430"/>
       </p:ext>
     </p:extLst>
   </p:cSld>
@@ -5341,7 +6310,7 @@
                 <a:latin typeface="Segoe UI Light" panose="020B0502040204020203" pitchFamily="34" charset="0"/>
                 <a:cs typeface="Segoe UI Light" panose="020B0502040204020203" pitchFamily="34" charset="0"/>
               </a:rPr>
-              <a:t>The structure of an HTML element</a:t>
+              <a:t>The structure of HTML</a:t>
             </a:r>
           </a:p>
         </p:txBody>
@@ -5384,19 +6353,17 @@
       </p:pic>
       <p:pic>
         <p:nvPicPr>
-          <p:cNvPr id="21" name="Content Placeholder 4">
+          <p:cNvPr id="7" name="Picture 6">
             <a:extLst>
               <a:ext uri="{FF2B5EF4-FFF2-40B4-BE49-F238E27FC236}">
-                <a16:creationId xmlns:a16="http://schemas.microsoft.com/office/drawing/2014/main" id="{7D6EF10F-02AF-43F3-BEC2-2B335C618774}"/>
+                <a16:creationId xmlns:a16="http://schemas.microsoft.com/office/drawing/2014/main" id="{002BB93D-092E-4EBC-B9F2-BA1304D240FF}"/>
               </a:ext>
             </a:extLst>
           </p:cNvPr>
           <p:cNvPicPr>
-            <a:picLocks noGrp="1" noChangeAspect="1"/>
+            <a:picLocks noChangeAspect="1"/>
           </p:cNvPicPr>
-          <p:nvPr>
-            <p:ph idx="1"/>
-          </p:nvPr>
+          <p:nvPr/>
         </p:nvPicPr>
         <p:blipFill>
           <a:blip r:embed="rId4"/>
@@ -5406,58 +6373,18 @@
         </p:blipFill>
         <p:spPr>
           <a:xfrm>
-            <a:off x="305423" y="3908132"/>
-            <a:ext cx="11581153" cy="1238626"/>
-          </a:xfrm>
-        </p:spPr>
-      </p:pic>
-      <p:sp>
-        <p:nvSpPr>
-          <p:cNvPr id="23" name="TextBox 22">
-            <a:extLst>
-              <a:ext uri="{FF2B5EF4-FFF2-40B4-BE49-F238E27FC236}">
-                <a16:creationId xmlns:a16="http://schemas.microsoft.com/office/drawing/2014/main" id="{54FB7B9D-1F89-42A1-A611-E928CC03DC90}"/>
-              </a:ext>
-            </a:extLst>
-          </p:cNvPr>
-          <p:cNvSpPr txBox="1"/>
-          <p:nvPr/>
-        </p:nvSpPr>
-        <p:spPr>
-          <a:xfrm>
-            <a:off x="412634" y="1535015"/>
-            <a:ext cx="11378313" cy="1938992"/>
+            <a:off x="0" y="1687011"/>
+            <a:ext cx="12207532" cy="3483978"/>
           </a:xfrm>
           <a:prstGeom prst="rect">
             <a:avLst/>
           </a:prstGeom>
-          <a:noFill/>
-        </p:spPr>
-        <p:txBody>
-          <a:bodyPr wrap="square" rtlCol="0">
-            <a:spAutoFit/>
-          </a:bodyPr>
-          <a:lstStyle/>
-          <a:p>
-            <a:pPr algn="ctr"/>
-            <a:r>
-              <a:rPr lang="en-NZ" sz="4000" dirty="0">
-                <a:solidFill>
-                  <a:schemeClr val="tx1">
-                    <a:lumMod val="65000"/>
-                    <a:lumOff val="35000"/>
-                  </a:schemeClr>
-                </a:solidFill>
-              </a:rPr>
-              <a:t>Some tags like the does not wrap around any content. Therefore, it does not require an accompanying closing tag.</a:t>
-            </a:r>
-          </a:p>
-        </p:txBody>
-      </p:sp>
+        </p:spPr>
+      </p:pic>
     </p:spTree>
     <p:extLst>
       <p:ext uri="{BB962C8B-B14F-4D97-AF65-F5344CB8AC3E}">
-        <p14:creationId xmlns:p14="http://schemas.microsoft.com/office/powerpoint/2010/main" val="1301615436"/>
+        <p14:creationId xmlns:p14="http://schemas.microsoft.com/office/powerpoint/2010/main" val="3564564786"/>
       </p:ext>
     </p:extLst>
   </p:cSld>
@@ -6058,21 +6985,6 @@
 </file>
 
 <file path=customXml/item1.xml><?xml version="1.0" encoding="utf-8"?>
-<p:properties xmlns:p="http://schemas.microsoft.com/office/2006/metadata/properties" xmlns:xsi="http://www.w3.org/2001/XMLSchema-instance" xmlns:pc="http://schemas.microsoft.com/office/infopath/2007/PartnerControls">
-  <documentManagement/>
-</p:properties>
-</file>
-
-<file path=customXml/item2.xml><?xml version="1.0" encoding="utf-8"?>
-<?mso-contentType ?>
-<FormTemplates xmlns="http://schemas.microsoft.com/sharepoint/v3/contenttype/forms">
-  <Display>DocumentLibraryForm</Display>
-  <Edit>DocumentLibraryForm</Edit>
-  <New>DocumentLibraryForm</New>
-</FormTemplates>
-</file>
-
-<file path=customXml/item3.xml><?xml version="1.0" encoding="utf-8"?>
 <ct:contentTypeSchema xmlns:ct="http://schemas.microsoft.com/office/2006/metadata/contentType" xmlns:ma="http://schemas.microsoft.com/office/2006/metadata/properties/metaAttributes" ct:_="" ma:_="" ma:contentTypeName="Document" ma:contentTypeID="0x010100E93C242A5CEB2D47B470CCC9086D4F41" ma:contentTypeVersion="8" ma:contentTypeDescription="Create a new document." ma:contentTypeScope="" ma:versionID="9f247184716c8b822e3549056a62d5ca">
   <xsd:schema xmlns:xsd="http://www.w3.org/2001/XMLSchema" xmlns:xs="http://www.w3.org/2001/XMLSchema" xmlns:p="http://schemas.microsoft.com/office/2006/metadata/properties" xmlns:ns2="b7ac0d6e-52d3-4232-9ee4-5c4d9894bf3c" targetNamespace="http://schemas.microsoft.com/office/2006/metadata/properties" ma:root="true" ma:fieldsID="067541c65ced21005bd2e6630d9f2f27" ns2:_="">
     <xsd:import namespace="b7ac0d6e-52d3-4232-9ee4-5c4d9894bf3c"/>
@@ -6244,31 +7156,22 @@
 </ct:contentTypeSchema>
 </file>
 
-<file path=customXml/itemProps1.xml><?xml version="1.0" encoding="utf-8"?>
-<ds:datastoreItem xmlns:ds="http://schemas.openxmlformats.org/officeDocument/2006/customXml" ds:itemID="{68BBE704-B474-4F72-9E56-BC8B9AC8B9DF}">
-  <ds:schemaRefs>
-    <ds:schemaRef ds:uri="http://purl.org/dc/terms/"/>
-    <ds:schemaRef ds:uri="http://schemas.openxmlformats.org/package/2006/metadata/core-properties"/>
-    <ds:schemaRef ds:uri="http://schemas.microsoft.com/office/2006/documentManagement/types"/>
-    <ds:schemaRef ds:uri="http://purl.org/dc/dcmitype/"/>
-    <ds:schemaRef ds:uri="http://schemas.microsoft.com/office/infopath/2007/PartnerControls"/>
-    <ds:schemaRef ds:uri="b7ac0d6e-52d3-4232-9ee4-5c4d9894bf3c"/>
-    <ds:schemaRef ds:uri="http://purl.org/dc/elements/1.1/"/>
-    <ds:schemaRef ds:uri="http://schemas.microsoft.com/office/2006/metadata/properties"/>
-    <ds:schemaRef ds:uri="http://www.w3.org/XML/1998/namespace"/>
-  </ds:schemaRefs>
-</ds:datastoreItem>
+<file path=customXml/item2.xml><?xml version="1.0" encoding="utf-8"?>
+<?mso-contentType ?>
+<FormTemplates xmlns="http://schemas.microsoft.com/sharepoint/v3/contenttype/forms">
+  <Display>DocumentLibraryForm</Display>
+  <Edit>DocumentLibraryForm</Edit>
+  <New>DocumentLibraryForm</New>
+</FormTemplates>
 </file>
 
-<file path=customXml/itemProps2.xml><?xml version="1.0" encoding="utf-8"?>
-<ds:datastoreItem xmlns:ds="http://schemas.openxmlformats.org/officeDocument/2006/customXml" ds:itemID="{0FD5B65A-65A2-4216-AFFD-8C37DA453243}">
-  <ds:schemaRefs>
-    <ds:schemaRef ds:uri="http://schemas.microsoft.com/sharepoint/v3/contenttype/forms"/>
-  </ds:schemaRefs>
-</ds:datastoreItem>
+<file path=customXml/item3.xml><?xml version="1.0" encoding="utf-8"?>
+<p:properties xmlns:p="http://schemas.microsoft.com/office/2006/metadata/properties" xmlns:xsi="http://www.w3.org/2001/XMLSchema-instance" xmlns:pc="http://schemas.microsoft.com/office/infopath/2007/PartnerControls">
+  <documentManagement/>
+</p:properties>
 </file>
 
-<file path=customXml/itemProps3.xml><?xml version="1.0" encoding="utf-8"?>
+<file path=customXml/itemProps1.xml><?xml version="1.0" encoding="utf-8"?>
 <ds:datastoreItem xmlns:ds="http://schemas.openxmlformats.org/officeDocument/2006/customXml" ds:itemID="{9B01F9E2-828F-4555-99E5-FC208D4750F5}">
   <ds:schemaRefs>
     <ds:schemaRef ds:uri="http://schemas.microsoft.com/office/2006/metadata/contentType"/>
@@ -6284,4 +7187,28 @@
     <ds:schemaRef ds:uri="http://schemas.microsoft.com/internal/obd"/>
   </ds:schemaRefs>
 </ds:datastoreItem>
+</file>
+
+<file path=customXml/itemProps2.xml><?xml version="1.0" encoding="utf-8"?>
+<ds:datastoreItem xmlns:ds="http://schemas.openxmlformats.org/officeDocument/2006/customXml" ds:itemID="{0FD5B65A-65A2-4216-AFFD-8C37DA453243}">
+  <ds:schemaRefs>
+    <ds:schemaRef ds:uri="http://schemas.microsoft.com/sharepoint/v3/contenttype/forms"/>
+  </ds:schemaRefs>
+</ds:datastoreItem>
+</file>
+
+<file path=customXml/itemProps3.xml><?xml version="1.0" encoding="utf-8"?>
+<ds:datastoreItem xmlns:ds="http://schemas.openxmlformats.org/officeDocument/2006/customXml" ds:itemID="{68BBE704-B474-4F72-9E56-BC8B9AC8B9DF}">
+  <ds:schemaRefs>
+    <ds:schemaRef ds:uri="http://purl.org/dc/terms/"/>
+    <ds:schemaRef ds:uri="http://schemas.openxmlformats.org/package/2006/metadata/core-properties"/>
+    <ds:schemaRef ds:uri="http://schemas.microsoft.com/office/2006/documentManagement/types"/>
+    <ds:schemaRef ds:uri="http://purl.org/dc/dcmitype/"/>
+    <ds:schemaRef ds:uri="http://schemas.microsoft.com/office/infopath/2007/PartnerControls"/>
+    <ds:schemaRef ds:uri="b7ac0d6e-52d3-4232-9ee4-5c4d9894bf3c"/>
+    <ds:schemaRef ds:uri="http://purl.org/dc/elements/1.1/"/>
+    <ds:schemaRef ds:uri="http://schemas.microsoft.com/office/2006/metadata/properties"/>
+    <ds:schemaRef ds:uri="http://www.w3.org/XML/1998/namespace"/>
+  </ds:schemaRefs>
+</ds:datastoreItem>
 </file>
</xml_diff>